<commit_message>
added code to image for app creation
</commit_message>
<xml_diff>
--- a/student-paper-competition-2014/images/images.pptx
+++ b/student-paper-competition-2014/images/images.pptx
@@ -301,7 +301,7 @@
           <a:p>
             <a:fld id="{F74648D0-5642-438F-8F02-AC3B4D73B72D}" type="datetimeFigureOut">
               <a:rPr lang="en-US" smtClean="0"/>
-              <a:t>12/5/2014</a:t>
+              <a:t>12/6/2014</a:t>
             </a:fld>
             <a:endParaRPr lang="en-US"/>
           </a:p>
@@ -471,7 +471,7 @@
           <a:p>
             <a:fld id="{F74648D0-5642-438F-8F02-AC3B4D73B72D}" type="datetimeFigureOut">
               <a:rPr lang="en-US" smtClean="0"/>
-              <a:t>12/5/2014</a:t>
+              <a:t>12/6/2014</a:t>
             </a:fld>
             <a:endParaRPr lang="en-US"/>
           </a:p>
@@ -651,7 +651,7 @@
           <a:p>
             <a:fld id="{F74648D0-5642-438F-8F02-AC3B4D73B72D}" type="datetimeFigureOut">
               <a:rPr lang="en-US" smtClean="0"/>
-              <a:t>12/5/2014</a:t>
+              <a:t>12/6/2014</a:t>
             </a:fld>
             <a:endParaRPr lang="en-US"/>
           </a:p>
@@ -821,7 +821,7 @@
           <a:p>
             <a:fld id="{F74648D0-5642-438F-8F02-AC3B4D73B72D}" type="datetimeFigureOut">
               <a:rPr lang="en-US" smtClean="0"/>
-              <a:t>12/5/2014</a:t>
+              <a:t>12/6/2014</a:t>
             </a:fld>
             <a:endParaRPr lang="en-US"/>
           </a:p>
@@ -1067,7 +1067,7 @@
           <a:p>
             <a:fld id="{F74648D0-5642-438F-8F02-AC3B4D73B72D}" type="datetimeFigureOut">
               <a:rPr lang="en-US" smtClean="0"/>
-              <a:t>12/5/2014</a:t>
+              <a:t>12/6/2014</a:t>
             </a:fld>
             <a:endParaRPr lang="en-US"/>
           </a:p>
@@ -1355,7 +1355,7 @@
           <a:p>
             <a:fld id="{F74648D0-5642-438F-8F02-AC3B4D73B72D}" type="datetimeFigureOut">
               <a:rPr lang="en-US" smtClean="0"/>
-              <a:t>12/5/2014</a:t>
+              <a:t>12/6/2014</a:t>
             </a:fld>
             <a:endParaRPr lang="en-US"/>
           </a:p>
@@ -1777,7 +1777,7 @@
           <a:p>
             <a:fld id="{F74648D0-5642-438F-8F02-AC3B4D73B72D}" type="datetimeFigureOut">
               <a:rPr lang="en-US" smtClean="0"/>
-              <a:t>12/5/2014</a:t>
+              <a:t>12/6/2014</a:t>
             </a:fld>
             <a:endParaRPr lang="en-US"/>
           </a:p>
@@ -1895,7 +1895,7 @@
           <a:p>
             <a:fld id="{F74648D0-5642-438F-8F02-AC3B4D73B72D}" type="datetimeFigureOut">
               <a:rPr lang="en-US" smtClean="0"/>
-              <a:t>12/5/2014</a:t>
+              <a:t>12/6/2014</a:t>
             </a:fld>
             <a:endParaRPr lang="en-US"/>
           </a:p>
@@ -1990,7 +1990,7 @@
           <a:p>
             <a:fld id="{F74648D0-5642-438F-8F02-AC3B4D73B72D}" type="datetimeFigureOut">
               <a:rPr lang="en-US" smtClean="0"/>
-              <a:t>12/5/2014</a:t>
+              <a:t>12/6/2014</a:t>
             </a:fld>
             <a:endParaRPr lang="en-US"/>
           </a:p>
@@ -2267,7 +2267,7 @@
           <a:p>
             <a:fld id="{F74648D0-5642-438F-8F02-AC3B4D73B72D}" type="datetimeFigureOut">
               <a:rPr lang="en-US" smtClean="0"/>
-              <a:t>12/5/2014</a:t>
+              <a:t>12/6/2014</a:t>
             </a:fld>
             <a:endParaRPr lang="en-US"/>
           </a:p>
@@ -2520,7 +2520,7 @@
           <a:p>
             <a:fld id="{F74648D0-5642-438F-8F02-AC3B4D73B72D}" type="datetimeFigureOut">
               <a:rPr lang="en-US" smtClean="0"/>
-              <a:t>12/5/2014</a:t>
+              <a:t>12/6/2014</a:t>
             </a:fld>
             <a:endParaRPr lang="en-US"/>
           </a:p>
@@ -2733,7 +2733,7 @@
           <a:p>
             <a:fld id="{F74648D0-5642-438F-8F02-AC3B4D73B72D}" type="datetimeFigureOut">
               <a:rPr lang="en-US" smtClean="0"/>
-              <a:t>12/5/2014</a:t>
+              <a:t>12/6/2014</a:t>
             </a:fld>
             <a:endParaRPr lang="en-US"/>
           </a:p>
@@ -3116,8 +3116,8 @@
         </p:nvSpPr>
         <p:spPr>
           <a:xfrm>
-            <a:off x="152400" y="152400"/>
-            <a:ext cx="8839200" cy="6137564"/>
+            <a:off x="152400" y="152399"/>
+            <a:ext cx="8786648" cy="6453353"/>
           </a:xfrm>
           <a:prstGeom prst="rect">
             <a:avLst/>
@@ -3225,7 +3225,7 @@
         </p:nvSpPr>
         <p:spPr>
           <a:xfrm>
-            <a:off x="2396836" y="547240"/>
+            <a:off x="2254942" y="231920"/>
             <a:ext cx="1981200" cy="2590800"/>
           </a:xfrm>
           <a:prstGeom prst="snip1Rect">
@@ -3271,7 +3271,7 @@
         </p:nvSpPr>
         <p:spPr>
           <a:xfrm>
-            <a:off x="4523506" y="547240"/>
+            <a:off x="4381612" y="231920"/>
             <a:ext cx="1981200" cy="2590800"/>
           </a:xfrm>
           <a:prstGeom prst="snip1Rect">
@@ -3317,7 +3317,7 @@
         </p:nvSpPr>
         <p:spPr>
           <a:xfrm>
-            <a:off x="2362200" y="561095"/>
+            <a:off x="2220306" y="245775"/>
             <a:ext cx="1981200" cy="381000"/>
           </a:xfrm>
           <a:prstGeom prst="rect">
@@ -3365,7 +3365,7 @@
         </p:nvSpPr>
         <p:spPr>
           <a:xfrm>
-            <a:off x="4523506" y="568023"/>
+            <a:off x="4381612" y="252703"/>
             <a:ext cx="1981200" cy="381000"/>
           </a:xfrm>
           <a:prstGeom prst="rect">
@@ -3426,7 +3426,7 @@
         </p:nvSpPr>
         <p:spPr>
           <a:xfrm>
-            <a:off x="2396836" y="942095"/>
+            <a:off x="2254942" y="626775"/>
             <a:ext cx="1981200" cy="2123658"/>
           </a:xfrm>
           <a:prstGeom prst="rect">
@@ -3535,7 +3535,7 @@
         </p:nvSpPr>
         <p:spPr>
           <a:xfrm>
-            <a:off x="4523506" y="942095"/>
+            <a:off x="4381612" y="626775"/>
             <a:ext cx="1981200" cy="2123658"/>
           </a:xfrm>
           <a:prstGeom prst="rect">
@@ -3647,7 +3647,7 @@
         </p:nvSpPr>
         <p:spPr>
           <a:xfrm>
-            <a:off x="2452254" y="1510130"/>
+            <a:off x="2310360" y="1194810"/>
             <a:ext cx="1870364" cy="1295400"/>
           </a:xfrm>
           <a:prstGeom prst="rect">
@@ -3696,7 +3696,7 @@
         </p:nvSpPr>
         <p:spPr>
           <a:xfrm>
-            <a:off x="4578924" y="1510130"/>
+            <a:off x="4437030" y="1194810"/>
             <a:ext cx="1870364" cy="1295400"/>
           </a:xfrm>
           <a:prstGeom prst="rect">
@@ -3745,7 +3745,7 @@
         </p:nvSpPr>
         <p:spPr>
           <a:xfrm>
-            <a:off x="3449780" y="3321614"/>
+            <a:off x="3307886" y="3006294"/>
             <a:ext cx="2189019" cy="2590800"/>
           </a:xfrm>
           <a:prstGeom prst="snip1Rect">
@@ -3793,7 +3793,7 @@
         </p:nvSpPr>
         <p:spPr>
           <a:xfrm>
-            <a:off x="3415145" y="3335469"/>
+            <a:off x="3273251" y="3020149"/>
             <a:ext cx="1981200" cy="381000"/>
           </a:xfrm>
           <a:prstGeom prst="rect">
@@ -3841,7 +3841,7 @@
         </p:nvSpPr>
         <p:spPr>
           <a:xfrm>
-            <a:off x="3449778" y="3852170"/>
+            <a:off x="3307884" y="3536850"/>
             <a:ext cx="2294805" cy="1615827"/>
           </a:xfrm>
           <a:prstGeom prst="rect">
@@ -4000,7 +4000,7 @@
         </p:nvCxnSpPr>
         <p:spPr>
           <a:xfrm rot="10800000" flipH="1" flipV="1">
-            <a:off x="2452254" y="2157830"/>
+            <a:off x="2310360" y="1842510"/>
             <a:ext cx="997526" cy="2459184"/>
           </a:xfrm>
           <a:prstGeom prst="curvedConnector3">
@@ -4046,7 +4046,7 @@
         </p:nvCxnSpPr>
         <p:spPr>
           <a:xfrm flipH="1">
-            <a:off x="5638799" y="2157830"/>
+            <a:off x="5496905" y="1842510"/>
             <a:ext cx="810489" cy="2459184"/>
           </a:xfrm>
           <a:prstGeom prst="curvedConnector3">
@@ -4089,8 +4089,8 @@
         </p:nvSpPr>
         <p:spPr>
           <a:xfrm>
-            <a:off x="457201" y="4433440"/>
-            <a:ext cx="1995054" cy="1600200"/>
+            <a:off x="315306" y="4118120"/>
+            <a:ext cx="2396829" cy="2324464"/>
           </a:xfrm>
           <a:prstGeom prst="snip1Rect">
             <a:avLst/>
@@ -4137,7 +4137,7 @@
         </p:nvSpPr>
         <p:spPr>
           <a:xfrm>
-            <a:off x="458249" y="3227633"/>
+            <a:off x="316355" y="2912313"/>
             <a:ext cx="1742250" cy="1194824"/>
           </a:xfrm>
           <a:custGeom>
@@ -4258,7 +4258,7 @@
         </p:nvCxnSpPr>
         <p:spPr>
           <a:xfrm flipH="1">
-            <a:off x="457201" y="3227633"/>
+            <a:off x="315307" y="2912313"/>
             <a:ext cx="339436" cy="1189138"/>
           </a:xfrm>
           <a:prstGeom prst="line">
@@ -4297,7 +4297,7 @@
         </p:nvCxnSpPr>
         <p:spPr>
           <a:xfrm>
-            <a:off x="2057401" y="3227633"/>
+            <a:off x="1915507" y="2912313"/>
             <a:ext cx="135730" cy="1189138"/>
           </a:xfrm>
           <a:prstGeom prst="line">
@@ -4336,7 +4336,7 @@
         </p:nvSpPr>
         <p:spPr>
           <a:xfrm>
-            <a:off x="796637" y="2886061"/>
+            <a:off x="654743" y="2570741"/>
             <a:ext cx="1336963" cy="1279815"/>
           </a:xfrm>
           <a:prstGeom prst="flowChartConnector">
@@ -4387,7 +4387,7 @@
         </p:nvSpPr>
         <p:spPr>
           <a:xfrm>
-            <a:off x="990598" y="2943504"/>
+            <a:off x="848704" y="2628184"/>
             <a:ext cx="1461654" cy="1169551"/>
           </a:xfrm>
           <a:prstGeom prst="rect">
@@ -4535,7 +4535,7 @@
         </p:nvSpPr>
         <p:spPr>
           <a:xfrm>
-            <a:off x="796637" y="2953313"/>
+            <a:off x="654743" y="2637993"/>
             <a:ext cx="1260763" cy="274320"/>
           </a:xfrm>
           <a:prstGeom prst="rect">
@@ -4576,61 +4576,13 @@
       </p:sp>
       <p:sp>
         <p:nvSpPr>
-          <p:cNvPr id="57" name="Snip Single Corner Rectangle 56"/>
-          <p:cNvSpPr/>
-          <p:nvPr/>
-        </p:nvSpPr>
-        <p:spPr>
-          <a:xfrm>
-            <a:off x="6503078" y="4460565"/>
-            <a:ext cx="1995054" cy="1600200"/>
-          </a:xfrm>
-          <a:prstGeom prst="snip1Rect">
-            <a:avLst/>
-          </a:prstGeom>
-          <a:solidFill>
-            <a:schemeClr val="bg1"/>
-          </a:solidFill>
-          <a:ln>
-            <a:solidFill>
-              <a:schemeClr val="bg1"/>
-            </a:solidFill>
-          </a:ln>
-        </p:spPr>
-        <p:style>
-          <a:lnRef idx="2">
-            <a:schemeClr val="accent1">
-              <a:shade val="50000"/>
-            </a:schemeClr>
-          </a:lnRef>
-          <a:fillRef idx="1">
-            <a:schemeClr val="accent1"/>
-          </a:fillRef>
-          <a:effectRef idx="0">
-            <a:schemeClr val="accent1"/>
-          </a:effectRef>
-          <a:fontRef idx="minor">
-            <a:schemeClr val="lt1"/>
-          </a:fontRef>
-        </p:style>
-        <p:txBody>
-          <a:bodyPr rtlCol="0" anchor="ctr"/>
-          <a:lstStyle/>
-          <a:p>
-            <a:pPr algn="ctr"/>
-            <a:endParaRPr lang="en-US" dirty="0"/>
-          </a:p>
-        </p:txBody>
-      </p:sp>
-      <p:sp>
-        <p:nvSpPr>
           <p:cNvPr id="58" name="Flowchart: Manual Operation 52"/>
           <p:cNvSpPr/>
           <p:nvPr/>
         </p:nvSpPr>
         <p:spPr>
           <a:xfrm>
-            <a:off x="6504126" y="3254758"/>
+            <a:off x="6362232" y="2939438"/>
             <a:ext cx="1742250" cy="1194824"/>
           </a:xfrm>
           <a:custGeom>
@@ -4751,7 +4703,7 @@
         </p:nvCxnSpPr>
         <p:spPr>
           <a:xfrm flipH="1">
-            <a:off x="6503078" y="3254758"/>
+            <a:off x="6361184" y="2939438"/>
             <a:ext cx="339436" cy="1189138"/>
           </a:xfrm>
           <a:prstGeom prst="line">
@@ -4790,7 +4742,7 @@
         </p:nvCxnSpPr>
         <p:spPr>
           <a:xfrm>
-            <a:off x="8103278" y="3254758"/>
+            <a:off x="7961384" y="2939438"/>
             <a:ext cx="135730" cy="1189138"/>
           </a:xfrm>
           <a:prstGeom prst="line">
@@ -4829,7 +4781,7 @@
         </p:nvSpPr>
         <p:spPr>
           <a:xfrm>
-            <a:off x="6842514" y="2913186"/>
+            <a:off x="6700620" y="2597866"/>
             <a:ext cx="1336963" cy="1279815"/>
           </a:xfrm>
           <a:prstGeom prst="flowChartConnector">
@@ -4880,7 +4832,7 @@
         </p:nvSpPr>
         <p:spPr>
           <a:xfrm>
-            <a:off x="7036475" y="2970629"/>
+            <a:off x="6894581" y="2655309"/>
             <a:ext cx="1461654" cy="307777"/>
           </a:xfrm>
           <a:prstGeom prst="rect">
@@ -4941,7 +4893,7 @@
         </p:nvSpPr>
         <p:spPr>
           <a:xfrm>
-            <a:off x="6842514" y="2980438"/>
+            <a:off x="6700620" y="2665118"/>
             <a:ext cx="1260763" cy="274320"/>
           </a:xfrm>
           <a:prstGeom prst="rect">
@@ -4988,8 +4940,8 @@
         </p:nvSpPr>
         <p:spPr>
           <a:xfrm>
-            <a:off x="457202" y="4449581"/>
-            <a:ext cx="1995054" cy="261610"/>
+            <a:off x="315306" y="4118120"/>
+            <a:ext cx="2396828" cy="2308324"/>
           </a:xfrm>
           <a:prstGeom prst="rect">
             <a:avLst/>
@@ -5003,65 +4955,374 @@
           <a:lstStyle/>
           <a:p>
             <a:r>
-              <a:rPr lang="en-US" sz="1100" dirty="0" smtClean="0">
-                <a:solidFill>
-                  <a:srgbClr val="FF0000"/>
-                </a:solidFill>
-                <a:latin typeface="Courier New" panose="02070309020205020404" pitchFamily="49" charset="0"/>
-                <a:cs typeface="Courier New" panose="02070309020205020404" pitchFamily="49" charset="0"/>
-              </a:rPr>
-              <a:t>Code goes here</a:t>
-            </a:r>
-            <a:endParaRPr lang="en-US" sz="1100" dirty="0">
-              <a:solidFill>
-                <a:srgbClr val="FF0000"/>
-              </a:solidFill>
+              <a:rPr lang="en-US" sz="900" dirty="0" err="1">
+                <a:latin typeface="Courier New" panose="02070309020205020404" pitchFamily="49" charset="0"/>
+                <a:cs typeface="Courier New" panose="02070309020205020404" pitchFamily="49" charset="0"/>
+              </a:rPr>
+              <a:t>nonparametrictable</a:t>
+            </a:r>
+            <a:r>
+              <a:rPr lang="en-US" sz="900" dirty="0">
+                <a:latin typeface="Courier New" panose="02070309020205020404" pitchFamily="49" charset="0"/>
+                <a:cs typeface="Courier New" panose="02070309020205020404" pitchFamily="49" charset="0"/>
+              </a:rPr>
+              <a:t> &lt;- </a:t>
+            </a:r>
+            <a:endParaRPr lang="en-US" sz="900" dirty="0" smtClean="0">
               <a:latin typeface="Courier New" panose="02070309020205020404" pitchFamily="49" charset="0"/>
               <a:cs typeface="Courier New" panose="02070309020205020404" pitchFamily="49" charset="0"/>
             </a:endParaRPr>
           </a:p>
-        </p:txBody>
-      </p:sp>
-      <p:sp>
-        <p:nvSpPr>
-          <p:cNvPr id="74" name="TextBox 73"/>
-          <p:cNvSpPr txBox="1"/>
-          <p:nvPr/>
-        </p:nvSpPr>
-        <p:spPr>
-          <a:xfrm>
-            <a:off x="6475368" y="4416771"/>
-            <a:ext cx="1995054" cy="261610"/>
-          </a:xfrm>
-          <a:prstGeom prst="rect">
-            <a:avLst/>
-          </a:prstGeom>
-          <a:noFill/>
-        </p:spPr>
-        <p:txBody>
-          <a:bodyPr wrap="square" rtlCol="0">
-            <a:spAutoFit/>
-          </a:bodyPr>
-          <a:lstStyle/>
-          <a:p>
-            <a:r>
-              <a:rPr lang="en-US" sz="1100" dirty="0" smtClean="0">
-                <a:solidFill>
-                  <a:srgbClr val="FF0000"/>
-                </a:solidFill>
-                <a:latin typeface="Courier New" panose="02070309020205020404" pitchFamily="49" charset="0"/>
-                <a:cs typeface="Courier New" panose="02070309020205020404" pitchFamily="49" charset="0"/>
-              </a:rPr>
-              <a:t>Code goes here</a:t>
-            </a:r>
-            <a:endParaRPr lang="en-US" sz="1100" dirty="0">
-              <a:solidFill>
-                <a:srgbClr val="FF0000"/>
-              </a:solidFill>
+          <a:p>
+            <a:r>
+              <a:rPr lang="en-US" sz="900" dirty="0" smtClean="0">
+                <a:latin typeface="Courier New" panose="02070309020205020404" pitchFamily="49" charset="0"/>
+                <a:cs typeface="Courier New" panose="02070309020205020404" pitchFamily="49" charset="0"/>
+              </a:rPr>
+              <a:t>function </a:t>
+            </a:r>
+            <a:r>
+              <a:rPr lang="en-US" sz="900" dirty="0">
+                <a:latin typeface="Courier New" panose="02070309020205020404" pitchFamily="49" charset="0"/>
+                <a:cs typeface="Courier New" panose="02070309020205020404" pitchFamily="49" charset="0"/>
+              </a:rPr>
+              <a:t>(</a:t>
+            </a:r>
+            <a:r>
+              <a:rPr lang="en-US" sz="900" dirty="0" err="1">
+                <a:latin typeface="Courier New" panose="02070309020205020404" pitchFamily="49" charset="0"/>
+                <a:cs typeface="Courier New" panose="02070309020205020404" pitchFamily="49" charset="0"/>
+              </a:rPr>
+              <a:t>intro.data</a:t>
+            </a:r>
+            <a:r>
+              <a:rPr lang="en-US" sz="900" dirty="0">
+                <a:latin typeface="Courier New" panose="02070309020205020404" pitchFamily="49" charset="0"/>
+                <a:cs typeface="Courier New" panose="02070309020205020404" pitchFamily="49" charset="0"/>
+              </a:rPr>
+              <a:t>, x, y, </a:t>
+            </a:r>
+            <a:r>
+              <a:rPr lang="en-US" sz="900" dirty="0" err="1">
+                <a:latin typeface="Courier New" panose="02070309020205020404" pitchFamily="49" charset="0"/>
+                <a:cs typeface="Courier New" panose="02070309020205020404" pitchFamily="49" charset="0"/>
+              </a:rPr>
+              <a:t>conflevel</a:t>
+            </a:r>
+            <a:r>
+              <a:rPr lang="en-US" sz="900" dirty="0">
+                <a:latin typeface="Courier New" panose="02070309020205020404" pitchFamily="49" charset="0"/>
+                <a:cs typeface="Courier New" panose="02070309020205020404" pitchFamily="49" charset="0"/>
+              </a:rPr>
+              <a:t>, </a:t>
+            </a:r>
+            <a:r>
+              <a:rPr lang="en-US" sz="900" dirty="0" err="1">
+                <a:latin typeface="Courier New" panose="02070309020205020404" pitchFamily="49" charset="0"/>
+                <a:cs typeface="Courier New" panose="02070309020205020404" pitchFamily="49" charset="0"/>
+              </a:rPr>
+              <a:t>althyp</a:t>
+            </a:r>
+            <a:r>
+              <a:rPr lang="en-US" sz="900" dirty="0">
+                <a:latin typeface="Courier New" panose="02070309020205020404" pitchFamily="49" charset="0"/>
+                <a:cs typeface="Courier New" panose="02070309020205020404" pitchFamily="49" charset="0"/>
+              </a:rPr>
+              <a:t>, </a:t>
+            </a:r>
+            <a:r>
+              <a:rPr lang="en-US" sz="900" dirty="0" err="1">
+                <a:latin typeface="Courier New" panose="02070309020205020404" pitchFamily="49" charset="0"/>
+                <a:cs typeface="Courier New" panose="02070309020205020404" pitchFamily="49" charset="0"/>
+              </a:rPr>
+              <a:t>hypval</a:t>
+            </a:r>
+            <a:r>
+              <a:rPr lang="en-US" sz="900" dirty="0">
+                <a:latin typeface="Courier New" panose="02070309020205020404" pitchFamily="49" charset="0"/>
+                <a:cs typeface="Courier New" panose="02070309020205020404" pitchFamily="49" charset="0"/>
+              </a:rPr>
+              <a:t>) </a:t>
+            </a:r>
+            <a:r>
+              <a:rPr lang="en-US" sz="900" dirty="0" smtClean="0">
+                <a:latin typeface="Courier New" panose="02070309020205020404" pitchFamily="49" charset="0"/>
+                <a:cs typeface="Courier New" panose="02070309020205020404" pitchFamily="49" charset="0"/>
+              </a:rPr>
+              <a:t>{</a:t>
+            </a:r>
+          </a:p>
+          <a:p>
+            <a:endParaRPr lang="en-US" sz="900" dirty="0">
               <a:latin typeface="Courier New" panose="02070309020205020404" pitchFamily="49" charset="0"/>
               <a:cs typeface="Courier New" panose="02070309020205020404" pitchFamily="49" charset="0"/>
             </a:endParaRPr>
           </a:p>
+          <a:p>
+            <a:r>
+              <a:rPr lang="en-US" sz="900" dirty="0" err="1" smtClean="0">
+                <a:latin typeface="Courier New" panose="02070309020205020404" pitchFamily="49" charset="0"/>
+                <a:cs typeface="Courier New" panose="02070309020205020404" pitchFamily="49" charset="0"/>
+              </a:rPr>
+              <a:t>cat_and_eval</a:t>
+            </a:r>
+            <a:r>
+              <a:rPr lang="en-US" sz="900" dirty="0" smtClean="0">
+                <a:latin typeface="Courier New" panose="02070309020205020404" pitchFamily="49" charset="0"/>
+                <a:cs typeface="Courier New" panose="02070309020205020404" pitchFamily="49" charset="0"/>
+              </a:rPr>
+              <a:t>(</a:t>
+            </a:r>
+          </a:p>
+          <a:p>
+            <a:pPr defTabSz="365760"/>
+            <a:r>
+              <a:rPr lang="en-US" sz="900" dirty="0" smtClean="0">
+                <a:latin typeface="Courier New" panose="02070309020205020404" pitchFamily="49" charset="0"/>
+                <a:cs typeface="Courier New" panose="02070309020205020404" pitchFamily="49" charset="0"/>
+              </a:rPr>
+              <a:t>paste0(</a:t>
+            </a:r>
+          </a:p>
+          <a:p>
+            <a:pPr defTabSz="365760"/>
+            <a:r>
+              <a:rPr lang="en-US" sz="900" dirty="0" smtClean="0">
+                <a:latin typeface="Courier New" panose="02070309020205020404" pitchFamily="49" charset="0"/>
+                <a:cs typeface="Courier New" panose="02070309020205020404" pitchFamily="49" charset="0"/>
+              </a:rPr>
+              <a:t>"</a:t>
+            </a:r>
+            <a:r>
+              <a:rPr lang="en-US" sz="900" dirty="0" err="1">
+                <a:latin typeface="Courier New" panose="02070309020205020404" pitchFamily="49" charset="0"/>
+                <a:cs typeface="Courier New" panose="02070309020205020404" pitchFamily="49" charset="0"/>
+              </a:rPr>
+              <a:t>wilcox.test</a:t>
+            </a:r>
+            <a:r>
+              <a:rPr lang="en-US" sz="900" dirty="0" smtClean="0">
+                <a:latin typeface="Courier New" panose="02070309020205020404" pitchFamily="49" charset="0"/>
+                <a:cs typeface="Courier New" panose="02070309020205020404" pitchFamily="49" charset="0"/>
+              </a:rPr>
+              <a:t>(</a:t>
+            </a:r>
+          </a:p>
+          <a:p>
+            <a:pPr defTabSz="365760"/>
+            <a:r>
+              <a:rPr lang="en-US" sz="900" dirty="0" smtClean="0">
+                <a:latin typeface="Courier New" panose="02070309020205020404" pitchFamily="49" charset="0"/>
+                <a:cs typeface="Courier New" panose="02070309020205020404" pitchFamily="49" charset="0"/>
+              </a:rPr>
+              <a:t>x=</a:t>
+            </a:r>
+            <a:r>
+              <a:rPr lang="en-US" sz="900" dirty="0" err="1" smtClean="0">
+                <a:latin typeface="Courier New" panose="02070309020205020404" pitchFamily="49" charset="0"/>
+                <a:cs typeface="Courier New" panose="02070309020205020404" pitchFamily="49" charset="0"/>
+              </a:rPr>
+              <a:t>intro.data</a:t>
+            </a:r>
+            <a:r>
+              <a:rPr lang="en-US" sz="900" dirty="0">
+                <a:latin typeface="Courier New" panose="02070309020205020404" pitchFamily="49" charset="0"/>
+                <a:cs typeface="Courier New" panose="02070309020205020404" pitchFamily="49" charset="0"/>
+              </a:rPr>
+              <a:t>[,'", x, "'], y=</a:t>
+            </a:r>
+            <a:r>
+              <a:rPr lang="en-US" sz="900" dirty="0" err="1">
+                <a:latin typeface="Courier New" panose="02070309020205020404" pitchFamily="49" charset="0"/>
+                <a:cs typeface="Courier New" panose="02070309020205020404" pitchFamily="49" charset="0"/>
+              </a:rPr>
+              <a:t>intro.data</a:t>
+            </a:r>
+            <a:r>
+              <a:rPr lang="en-US" sz="900" dirty="0">
+                <a:latin typeface="Courier New" panose="02070309020205020404" pitchFamily="49" charset="0"/>
+                <a:cs typeface="Courier New" panose="02070309020205020404" pitchFamily="49" charset="0"/>
+              </a:rPr>
+              <a:t>[,'", y, "'], </a:t>
+            </a:r>
+            <a:r>
+              <a:rPr lang="en-US" sz="900" dirty="0" err="1">
+                <a:latin typeface="Courier New" panose="02070309020205020404" pitchFamily="49" charset="0"/>
+                <a:cs typeface="Courier New" panose="02070309020205020404" pitchFamily="49" charset="0"/>
+              </a:rPr>
+              <a:t>conf.level</a:t>
+            </a:r>
+            <a:r>
+              <a:rPr lang="en-US" sz="900" dirty="0">
+                <a:latin typeface="Courier New" panose="02070309020205020404" pitchFamily="49" charset="0"/>
+                <a:cs typeface="Courier New" panose="02070309020205020404" pitchFamily="49" charset="0"/>
+              </a:rPr>
+              <a:t>=", </a:t>
+            </a:r>
+            <a:r>
+              <a:rPr lang="en-US" sz="900" dirty="0" err="1">
+                <a:latin typeface="Courier New" panose="02070309020205020404" pitchFamily="49" charset="0"/>
+                <a:cs typeface="Courier New" panose="02070309020205020404" pitchFamily="49" charset="0"/>
+              </a:rPr>
+              <a:t>conflevel</a:t>
+            </a:r>
+            <a:r>
+              <a:rPr lang="en-US" sz="900" dirty="0">
+                <a:latin typeface="Courier New" panose="02070309020205020404" pitchFamily="49" charset="0"/>
+                <a:cs typeface="Courier New" panose="02070309020205020404" pitchFamily="49" charset="0"/>
+              </a:rPr>
+              <a:t>, ", alternative='", </a:t>
+            </a:r>
+            <a:r>
+              <a:rPr lang="en-US" sz="900" dirty="0" err="1">
+                <a:latin typeface="Courier New" panose="02070309020205020404" pitchFamily="49" charset="0"/>
+                <a:cs typeface="Courier New" panose="02070309020205020404" pitchFamily="49" charset="0"/>
+              </a:rPr>
+              <a:t>althyp</a:t>
+            </a:r>
+            <a:r>
+              <a:rPr lang="en-US" sz="900" dirty="0">
+                <a:latin typeface="Courier New" panose="02070309020205020404" pitchFamily="49" charset="0"/>
+                <a:cs typeface="Courier New" panose="02070309020205020404" pitchFamily="49" charset="0"/>
+              </a:rPr>
+              <a:t>, "', mu=", </a:t>
+            </a:r>
+            <a:r>
+              <a:rPr lang="en-US" sz="900" dirty="0" err="1">
+                <a:latin typeface="Courier New" panose="02070309020205020404" pitchFamily="49" charset="0"/>
+                <a:cs typeface="Courier New" panose="02070309020205020404" pitchFamily="49" charset="0"/>
+              </a:rPr>
+              <a:t>hypval</a:t>
+            </a:r>
+            <a:r>
+              <a:rPr lang="en-US" sz="900" dirty="0">
+                <a:latin typeface="Courier New" panose="02070309020205020404" pitchFamily="49" charset="0"/>
+                <a:cs typeface="Courier New" panose="02070309020205020404" pitchFamily="49" charset="0"/>
+              </a:rPr>
+              <a:t>, ")"),  </a:t>
+            </a:r>
+            <a:endParaRPr lang="en-US" sz="900" dirty="0" smtClean="0">
+              <a:latin typeface="Courier New" panose="02070309020205020404" pitchFamily="49" charset="0"/>
+              <a:cs typeface="Courier New" panose="02070309020205020404" pitchFamily="49" charset="0"/>
+            </a:endParaRPr>
+          </a:p>
+          <a:p>
+            <a:pPr defTabSz="365760"/>
+            <a:r>
+              <a:rPr lang="en-US" sz="900" dirty="0" err="1" smtClean="0">
+                <a:latin typeface="Courier New" panose="02070309020205020404" pitchFamily="49" charset="0"/>
+                <a:cs typeface="Courier New" panose="02070309020205020404" pitchFamily="49" charset="0"/>
+              </a:rPr>
+              <a:t>mydir</a:t>
+            </a:r>
+            <a:r>
+              <a:rPr lang="en-US" sz="900" dirty="0" smtClean="0">
+                <a:latin typeface="Courier New" panose="02070309020205020404" pitchFamily="49" charset="0"/>
+                <a:cs typeface="Courier New" panose="02070309020205020404" pitchFamily="49" charset="0"/>
+              </a:rPr>
+              <a:t> </a:t>
+            </a:r>
+            <a:r>
+              <a:rPr lang="en-US" sz="900" dirty="0">
+                <a:latin typeface="Courier New" panose="02070309020205020404" pitchFamily="49" charset="0"/>
+                <a:cs typeface="Courier New" panose="02070309020205020404" pitchFamily="49" charset="0"/>
+              </a:rPr>
+              <a:t>= </a:t>
+            </a:r>
+            <a:r>
+              <a:rPr lang="en-US" sz="900" dirty="0" err="1">
+                <a:latin typeface="Courier New" panose="02070309020205020404" pitchFamily="49" charset="0"/>
+                <a:cs typeface="Courier New" panose="02070309020205020404" pitchFamily="49" charset="0"/>
+              </a:rPr>
+              <a:t>userdir</a:t>
+            </a:r>
+            <a:r>
+              <a:rPr lang="en-US" sz="900" dirty="0">
+                <a:latin typeface="Courier New" panose="02070309020205020404" pitchFamily="49" charset="0"/>
+                <a:cs typeface="Courier New" panose="02070309020205020404" pitchFamily="49" charset="0"/>
+              </a:rPr>
+              <a:t>, </a:t>
+            </a:r>
+            <a:endParaRPr lang="en-US" sz="900" dirty="0" smtClean="0">
+              <a:latin typeface="Courier New" panose="02070309020205020404" pitchFamily="49" charset="0"/>
+              <a:cs typeface="Courier New" panose="02070309020205020404" pitchFamily="49" charset="0"/>
+            </a:endParaRPr>
+          </a:p>
+          <a:p>
+            <a:pPr defTabSz="365760"/>
+            <a:r>
+              <a:rPr lang="en-US" sz="900" dirty="0" err="1" smtClean="0">
+                <a:latin typeface="Courier New" panose="02070309020205020404" pitchFamily="49" charset="0"/>
+                <a:cs typeface="Courier New" panose="02070309020205020404" pitchFamily="49" charset="0"/>
+              </a:rPr>
+              <a:t>env</a:t>
+            </a:r>
+            <a:r>
+              <a:rPr lang="en-US" sz="900" dirty="0" smtClean="0">
+                <a:latin typeface="Courier New" panose="02070309020205020404" pitchFamily="49" charset="0"/>
+                <a:cs typeface="Courier New" panose="02070309020205020404" pitchFamily="49" charset="0"/>
+              </a:rPr>
+              <a:t> </a:t>
+            </a:r>
+            <a:r>
+              <a:rPr lang="en-US" sz="900" dirty="0">
+                <a:latin typeface="Courier New" panose="02070309020205020404" pitchFamily="49" charset="0"/>
+                <a:cs typeface="Courier New" panose="02070309020205020404" pitchFamily="49" charset="0"/>
+              </a:rPr>
+              <a:t>= environment</a:t>
+            </a:r>
+            <a:r>
+              <a:rPr lang="en-US" sz="900" dirty="0" smtClean="0">
+                <a:latin typeface="Courier New" panose="02070309020205020404" pitchFamily="49" charset="0"/>
+                <a:cs typeface="Courier New" panose="02070309020205020404" pitchFamily="49" charset="0"/>
+              </a:rPr>
+              <a:t>(),</a:t>
+            </a:r>
+          </a:p>
+          <a:p>
+            <a:pPr defTabSz="365760"/>
+            <a:r>
+              <a:rPr lang="en-US" sz="900" dirty="0" smtClean="0">
+                <a:latin typeface="Courier New" panose="02070309020205020404" pitchFamily="49" charset="0"/>
+                <a:cs typeface="Courier New" panose="02070309020205020404" pitchFamily="49" charset="0"/>
+              </a:rPr>
+              <a:t> </a:t>
+            </a:r>
+            <a:r>
+              <a:rPr lang="en-US" sz="900" dirty="0">
+                <a:latin typeface="Courier New" panose="02070309020205020404" pitchFamily="49" charset="0"/>
+                <a:cs typeface="Courier New" panose="02070309020205020404" pitchFamily="49" charset="0"/>
+              </a:rPr>
+              <a:t>file = "</a:t>
+            </a:r>
+            <a:r>
+              <a:rPr lang="en-US" sz="900" dirty="0" err="1">
+                <a:latin typeface="Courier New" panose="02070309020205020404" pitchFamily="49" charset="0"/>
+                <a:cs typeface="Courier New" panose="02070309020205020404" pitchFamily="49" charset="0"/>
+              </a:rPr>
+              <a:t>code_nonparametric.R</a:t>
+            </a:r>
+            <a:r>
+              <a:rPr lang="en-US" sz="900" dirty="0">
+                <a:latin typeface="Courier New" panose="02070309020205020404" pitchFamily="49" charset="0"/>
+                <a:cs typeface="Courier New" panose="02070309020205020404" pitchFamily="49" charset="0"/>
+              </a:rPr>
+              <a:t>")</a:t>
+            </a:r>
+          </a:p>
+          <a:p>
+            <a:r>
+              <a:rPr lang="en-US" sz="900" dirty="0">
+                <a:latin typeface="Courier New" panose="02070309020205020404" pitchFamily="49" charset="0"/>
+                <a:cs typeface="Courier New" panose="02070309020205020404" pitchFamily="49" charset="0"/>
+              </a:rPr>
+              <a:t>}</a:t>
+            </a:r>
+            <a:endParaRPr lang="en-US" sz="900" dirty="0">
+              <a:latin typeface="Courier New" panose="02070309020205020404" pitchFamily="49" charset="0"/>
+              <a:cs typeface="Courier New" panose="02070309020205020404" pitchFamily="49" charset="0"/>
+            </a:endParaRPr>
+          </a:p>
         </p:txBody>
       </p:sp>
       <p:sp>
@@ -5072,7 +5333,7 @@
         </p:nvSpPr>
         <p:spPr>
           <a:xfrm>
-            <a:off x="263231" y="2618507"/>
+            <a:off x="121337" y="2303187"/>
             <a:ext cx="2590799" cy="307777"/>
           </a:xfrm>
           <a:prstGeom prst="rect">
@@ -5120,7 +5381,7 @@
         </p:nvSpPr>
         <p:spPr>
           <a:xfrm>
-            <a:off x="6577452" y="2618507"/>
+            <a:off x="6435558" y="2303187"/>
             <a:ext cx="2590799" cy="307777"/>
           </a:xfrm>
           <a:prstGeom prst="rect">
@@ -5156,6 +5417,453 @@
               </a:solidFill>
               <a:latin typeface="Cambria Math" panose="02040503050406030204" pitchFamily="18" charset="0"/>
               <a:ea typeface="Cambria Math" panose="02040503050406030204" pitchFamily="18" charset="0"/>
+            </a:endParaRPr>
+          </a:p>
+        </p:txBody>
+      </p:sp>
+      <p:sp>
+        <p:nvSpPr>
+          <p:cNvPr id="38" name="Snip Single Corner Rectangle 37"/>
+          <p:cNvSpPr/>
+          <p:nvPr/>
+        </p:nvSpPr>
+        <p:spPr>
+          <a:xfrm>
+            <a:off x="6362812" y="4118120"/>
+            <a:ext cx="2396829" cy="2324464"/>
+          </a:xfrm>
+          <a:prstGeom prst="snip1Rect">
+            <a:avLst/>
+          </a:prstGeom>
+          <a:solidFill>
+            <a:schemeClr val="bg1"/>
+          </a:solidFill>
+          <a:ln>
+            <a:solidFill>
+              <a:schemeClr val="bg1"/>
+            </a:solidFill>
+          </a:ln>
+        </p:spPr>
+        <p:style>
+          <a:lnRef idx="2">
+            <a:schemeClr val="accent1">
+              <a:shade val="50000"/>
+            </a:schemeClr>
+          </a:lnRef>
+          <a:fillRef idx="1">
+            <a:schemeClr val="accent1"/>
+          </a:fillRef>
+          <a:effectRef idx="0">
+            <a:schemeClr val="accent1"/>
+          </a:effectRef>
+          <a:fontRef idx="minor">
+            <a:schemeClr val="lt1"/>
+          </a:fontRef>
+        </p:style>
+        <p:txBody>
+          <a:bodyPr rtlCol="0" anchor="ctr"/>
+          <a:lstStyle/>
+          <a:p>
+            <a:pPr algn="ctr"/>
+            <a:endParaRPr lang="en-US" dirty="0"/>
+          </a:p>
+        </p:txBody>
+      </p:sp>
+      <p:sp>
+        <p:nvSpPr>
+          <p:cNvPr id="39" name="TextBox 38"/>
+          <p:cNvSpPr txBox="1"/>
+          <p:nvPr/>
+        </p:nvSpPr>
+        <p:spPr>
+          <a:xfrm>
+            <a:off x="6362812" y="4118120"/>
+            <a:ext cx="2396828" cy="2308324"/>
+          </a:xfrm>
+          <a:prstGeom prst="rect">
+            <a:avLst/>
+          </a:prstGeom>
+          <a:noFill/>
+        </p:spPr>
+        <p:txBody>
+          <a:bodyPr wrap="square" rtlCol="0">
+            <a:spAutoFit/>
+          </a:bodyPr>
+          <a:lstStyle/>
+          <a:p>
+            <a:r>
+              <a:rPr lang="en-US" sz="900" dirty="0" err="1" smtClean="0">
+                <a:latin typeface="Courier New" panose="02070309020205020404" pitchFamily="49" charset="0"/>
+                <a:cs typeface="Courier New" panose="02070309020205020404" pitchFamily="49" charset="0"/>
+              </a:rPr>
+              <a:t>nonparametric_ui</a:t>
+            </a:r>
+            <a:r>
+              <a:rPr lang="en-US" sz="900" dirty="0" smtClean="0">
+                <a:latin typeface="Courier New" panose="02070309020205020404" pitchFamily="49" charset="0"/>
+                <a:cs typeface="Courier New" panose="02070309020205020404" pitchFamily="49" charset="0"/>
+              </a:rPr>
+              <a:t> </a:t>
+            </a:r>
+            <a:r>
+              <a:rPr lang="en-US" sz="900" dirty="0">
+                <a:latin typeface="Courier New" panose="02070309020205020404" pitchFamily="49" charset="0"/>
+                <a:cs typeface="Courier New" panose="02070309020205020404" pitchFamily="49" charset="0"/>
+              </a:rPr>
+              <a:t>&lt;- </a:t>
+            </a:r>
+            <a:r>
+              <a:rPr lang="en-US" sz="900" dirty="0" err="1">
+                <a:latin typeface="Courier New" panose="02070309020205020404" pitchFamily="49" charset="0"/>
+                <a:cs typeface="Courier New" panose="02070309020205020404" pitchFamily="49" charset="0"/>
+              </a:rPr>
+              <a:t>tabPanel</a:t>
+            </a:r>
+            <a:r>
+              <a:rPr lang="en-US" sz="900" dirty="0">
+                <a:latin typeface="Courier New" panose="02070309020205020404" pitchFamily="49" charset="0"/>
+                <a:cs typeface="Courier New" panose="02070309020205020404" pitchFamily="49" charset="0"/>
+              </a:rPr>
+              <a:t>("Nonparametric",</a:t>
+            </a:r>
+          </a:p>
+          <a:p>
+            <a:r>
+              <a:rPr lang="en-US" sz="900" dirty="0" smtClean="0">
+                <a:latin typeface="Courier New" panose="02070309020205020404" pitchFamily="49" charset="0"/>
+                <a:cs typeface="Courier New" panose="02070309020205020404" pitchFamily="49" charset="0"/>
+              </a:rPr>
+              <a:t>column(4, </a:t>
+            </a:r>
+            <a:r>
+              <a:rPr lang="en-US" sz="900" dirty="0" err="1" smtClean="0">
+                <a:latin typeface="Courier New" panose="02070309020205020404" pitchFamily="49" charset="0"/>
+                <a:cs typeface="Courier New" panose="02070309020205020404" pitchFamily="49" charset="0"/>
+              </a:rPr>
+              <a:t>wellPanel</a:t>
+            </a:r>
+            <a:r>
+              <a:rPr lang="en-US" sz="900" dirty="0">
+                <a:latin typeface="Courier New" panose="02070309020205020404" pitchFamily="49" charset="0"/>
+                <a:cs typeface="Courier New" panose="02070309020205020404" pitchFamily="49" charset="0"/>
+              </a:rPr>
+              <a:t>(</a:t>
+            </a:r>
+          </a:p>
+          <a:p>
+            <a:r>
+              <a:rPr lang="en-US" sz="900" dirty="0" err="1" smtClean="0">
+                <a:latin typeface="Courier New" panose="02070309020205020404" pitchFamily="49" charset="0"/>
+                <a:cs typeface="Courier New" panose="02070309020205020404" pitchFamily="49" charset="0"/>
+              </a:rPr>
+              <a:t>selectizeInput</a:t>
+            </a:r>
+            <a:r>
+              <a:rPr lang="en-US" sz="900" dirty="0">
+                <a:latin typeface="Courier New" panose="02070309020205020404" pitchFamily="49" charset="0"/>
+                <a:cs typeface="Courier New" panose="02070309020205020404" pitchFamily="49" charset="0"/>
+              </a:rPr>
+              <a:t>("</a:t>
+            </a:r>
+            <a:r>
+              <a:rPr lang="en-US" sz="900" dirty="0" smtClean="0">
+                <a:latin typeface="Courier New" panose="02070309020205020404" pitchFamily="49" charset="0"/>
+                <a:cs typeface="Courier New" panose="02070309020205020404" pitchFamily="49" charset="0"/>
+              </a:rPr>
+              <a:t>group1_non</a:t>
+            </a:r>
+            <a:r>
+              <a:rPr lang="en-US" sz="900" dirty="0">
+                <a:latin typeface="Courier New" panose="02070309020205020404" pitchFamily="49" charset="0"/>
+                <a:cs typeface="Courier New" panose="02070309020205020404" pitchFamily="49" charset="0"/>
+              </a:rPr>
+              <a:t>"</a:t>
+            </a:r>
+            <a:r>
+              <a:rPr lang="en-US" sz="900" dirty="0" smtClean="0">
+                <a:latin typeface="Courier New" panose="02070309020205020404" pitchFamily="49" charset="0"/>
+                <a:cs typeface="Courier New" panose="02070309020205020404" pitchFamily="49" charset="0"/>
+              </a:rPr>
+              <a:t>, …),</a:t>
+            </a:r>
+            <a:endParaRPr lang="en-US" sz="900" dirty="0">
+              <a:latin typeface="Courier New" panose="02070309020205020404" pitchFamily="49" charset="0"/>
+              <a:cs typeface="Courier New" panose="02070309020205020404" pitchFamily="49" charset="0"/>
+            </a:endParaRPr>
+          </a:p>
+          <a:p>
+            <a:r>
+              <a:rPr lang="en-US" sz="900" dirty="0" err="1" smtClean="0">
+                <a:latin typeface="Courier New" panose="02070309020205020404" pitchFamily="49" charset="0"/>
+                <a:cs typeface="Courier New" panose="02070309020205020404" pitchFamily="49" charset="0"/>
+              </a:rPr>
+              <a:t>selectizeInput</a:t>
+            </a:r>
+            <a:r>
+              <a:rPr lang="en-US" sz="900" dirty="0">
+                <a:latin typeface="Courier New" panose="02070309020205020404" pitchFamily="49" charset="0"/>
+                <a:cs typeface="Courier New" panose="02070309020205020404" pitchFamily="49" charset="0"/>
+              </a:rPr>
+              <a:t>("group2_non</a:t>
+            </a:r>
+            <a:r>
+              <a:rPr lang="en-US" sz="900" dirty="0" smtClean="0">
+                <a:latin typeface="Courier New" panose="02070309020205020404" pitchFamily="49" charset="0"/>
+                <a:cs typeface="Courier New" panose="02070309020205020404" pitchFamily="49" charset="0"/>
+              </a:rPr>
+              <a:t>", …),</a:t>
+            </a:r>
+            <a:endParaRPr lang="en-US" sz="900" dirty="0">
+              <a:latin typeface="Courier New" panose="02070309020205020404" pitchFamily="49" charset="0"/>
+              <a:cs typeface="Courier New" panose="02070309020205020404" pitchFamily="49" charset="0"/>
+            </a:endParaRPr>
+          </a:p>
+          <a:p>
+            <a:r>
+              <a:rPr lang="en-US" sz="900" dirty="0" err="1" smtClean="0">
+                <a:latin typeface="Courier New" panose="02070309020205020404" pitchFamily="49" charset="0"/>
+                <a:cs typeface="Courier New" panose="02070309020205020404" pitchFamily="49" charset="0"/>
+              </a:rPr>
+              <a:t>hr</a:t>
+            </a:r>
+            <a:r>
+              <a:rPr lang="en-US" sz="900" dirty="0">
+                <a:latin typeface="Courier New" panose="02070309020205020404" pitchFamily="49" charset="0"/>
+                <a:cs typeface="Courier New" panose="02070309020205020404" pitchFamily="49" charset="0"/>
+              </a:rPr>
+              <a:t>(),</a:t>
+            </a:r>
+          </a:p>
+          <a:p>
+            <a:r>
+              <a:rPr lang="en-US" sz="900" dirty="0" err="1" smtClean="0">
+                <a:latin typeface="Courier New" panose="02070309020205020404" pitchFamily="49" charset="0"/>
+                <a:cs typeface="Courier New" panose="02070309020205020404" pitchFamily="49" charset="0"/>
+              </a:rPr>
+              <a:t>selectizeInput</a:t>
+            </a:r>
+            <a:r>
+              <a:rPr lang="en-US" sz="900" dirty="0" smtClean="0">
+                <a:latin typeface="Courier New" panose="02070309020205020404" pitchFamily="49" charset="0"/>
+                <a:cs typeface="Courier New" panose="02070309020205020404" pitchFamily="49" charset="0"/>
+              </a:rPr>
+              <a:t>(</a:t>
+            </a:r>
+            <a:r>
+              <a:rPr lang="en-US" sz="900" dirty="0">
+                <a:latin typeface="Courier New" panose="02070309020205020404" pitchFamily="49" charset="0"/>
+                <a:cs typeface="Courier New" panose="02070309020205020404" pitchFamily="49" charset="0"/>
+              </a:rPr>
+              <a:t>"</a:t>
+            </a:r>
+            <a:r>
+              <a:rPr lang="en-US" sz="900" dirty="0" err="1" smtClean="0">
+                <a:latin typeface="Courier New" panose="02070309020205020404" pitchFamily="49" charset="0"/>
+                <a:cs typeface="Courier New" panose="02070309020205020404" pitchFamily="49" charset="0"/>
+              </a:rPr>
+              <a:t>althyp_non</a:t>
+            </a:r>
+            <a:r>
+              <a:rPr lang="en-US" sz="900" dirty="0" smtClean="0">
+                <a:latin typeface="Courier New" panose="02070309020205020404" pitchFamily="49" charset="0"/>
+                <a:cs typeface="Courier New" panose="02070309020205020404" pitchFamily="49" charset="0"/>
+              </a:rPr>
+              <a:t>", …),</a:t>
+            </a:r>
+            <a:endParaRPr lang="en-US" sz="900" dirty="0">
+              <a:latin typeface="Courier New" panose="02070309020205020404" pitchFamily="49" charset="0"/>
+              <a:cs typeface="Courier New" panose="02070309020205020404" pitchFamily="49" charset="0"/>
+            </a:endParaRPr>
+          </a:p>
+          <a:p>
+            <a:r>
+              <a:rPr lang="en-US" sz="900" dirty="0" err="1" smtClean="0">
+                <a:latin typeface="Courier New" panose="02070309020205020404" pitchFamily="49" charset="0"/>
+                <a:cs typeface="Courier New" panose="02070309020205020404" pitchFamily="49" charset="0"/>
+              </a:rPr>
+              <a:t>numericInput</a:t>
+            </a:r>
+            <a:r>
+              <a:rPr lang="en-US" sz="900" dirty="0">
+                <a:latin typeface="Courier New" panose="02070309020205020404" pitchFamily="49" charset="0"/>
+                <a:cs typeface="Courier New" panose="02070309020205020404" pitchFamily="49" charset="0"/>
+              </a:rPr>
+              <a:t>("</a:t>
+            </a:r>
+            <a:r>
+              <a:rPr lang="en-US" sz="900" dirty="0" err="1">
+                <a:latin typeface="Courier New" panose="02070309020205020404" pitchFamily="49" charset="0"/>
+                <a:cs typeface="Courier New" panose="02070309020205020404" pitchFamily="49" charset="0"/>
+              </a:rPr>
+              <a:t>hypval_non</a:t>
+            </a:r>
+            <a:r>
+              <a:rPr lang="en-US" sz="900" dirty="0" smtClean="0">
+                <a:latin typeface="Courier New" panose="02070309020205020404" pitchFamily="49" charset="0"/>
+                <a:cs typeface="Courier New" panose="02070309020205020404" pitchFamily="49" charset="0"/>
+              </a:rPr>
+              <a:t>", …),</a:t>
+            </a:r>
+            <a:endParaRPr lang="en-US" sz="900" dirty="0">
+              <a:latin typeface="Courier New" panose="02070309020205020404" pitchFamily="49" charset="0"/>
+              <a:cs typeface="Courier New" panose="02070309020205020404" pitchFamily="49" charset="0"/>
+            </a:endParaRPr>
+          </a:p>
+          <a:p>
+            <a:r>
+              <a:rPr lang="en-US" sz="900" dirty="0" err="1" smtClean="0">
+                <a:latin typeface="Courier New" panose="02070309020205020404" pitchFamily="49" charset="0"/>
+                <a:cs typeface="Courier New" panose="02070309020205020404" pitchFamily="49" charset="0"/>
+              </a:rPr>
+              <a:t>sliderInput</a:t>
+            </a:r>
+            <a:r>
+              <a:rPr lang="en-US" sz="900" dirty="0">
+                <a:latin typeface="Courier New" panose="02070309020205020404" pitchFamily="49" charset="0"/>
+                <a:cs typeface="Courier New" panose="02070309020205020404" pitchFamily="49" charset="0"/>
+              </a:rPr>
+              <a:t>("</a:t>
+            </a:r>
+            <a:r>
+              <a:rPr lang="en-US" sz="900" dirty="0" err="1">
+                <a:latin typeface="Courier New" panose="02070309020205020404" pitchFamily="49" charset="0"/>
+                <a:cs typeface="Courier New" panose="02070309020205020404" pitchFamily="49" charset="0"/>
+              </a:rPr>
+              <a:t>conflevel_non</a:t>
+            </a:r>
+            <a:r>
+              <a:rPr lang="en-US" sz="900" dirty="0" smtClean="0">
+                <a:latin typeface="Courier New" panose="02070309020205020404" pitchFamily="49" charset="0"/>
+                <a:cs typeface="Courier New" panose="02070309020205020404" pitchFamily="49" charset="0"/>
+              </a:rPr>
+              <a:t>", …),</a:t>
+            </a:r>
+            <a:endParaRPr lang="en-US" sz="900" dirty="0">
+              <a:latin typeface="Courier New" panose="02070309020205020404" pitchFamily="49" charset="0"/>
+              <a:cs typeface="Courier New" panose="02070309020205020404" pitchFamily="49" charset="0"/>
+            </a:endParaRPr>
+          </a:p>
+          <a:p>
+            <a:r>
+              <a:rPr lang="en-US" sz="900" dirty="0" err="1" smtClean="0">
+                <a:latin typeface="Courier New" panose="02070309020205020404" pitchFamily="49" charset="0"/>
+                <a:cs typeface="Courier New" panose="02070309020205020404" pitchFamily="49" charset="0"/>
+              </a:rPr>
+              <a:t>hr</a:t>
+            </a:r>
+            <a:r>
+              <a:rPr lang="en-US" sz="900" dirty="0">
+                <a:latin typeface="Courier New" panose="02070309020205020404" pitchFamily="49" charset="0"/>
+                <a:cs typeface="Courier New" panose="02070309020205020404" pitchFamily="49" charset="0"/>
+              </a:rPr>
+              <a:t>(),</a:t>
+            </a:r>
+          </a:p>
+          <a:p>
+            <a:r>
+              <a:rPr lang="en-US" sz="900" dirty="0" err="1" smtClean="0">
+                <a:latin typeface="Courier New" panose="02070309020205020404" pitchFamily="49" charset="0"/>
+                <a:cs typeface="Courier New" panose="02070309020205020404" pitchFamily="49" charset="0"/>
+              </a:rPr>
+              <a:t>tags$button</a:t>
+            </a:r>
+            <a:r>
+              <a:rPr lang="en-US" sz="900" dirty="0">
+                <a:latin typeface="Courier New" panose="02070309020205020404" pitchFamily="49" charset="0"/>
+                <a:cs typeface="Courier New" panose="02070309020205020404" pitchFamily="49" charset="0"/>
+              </a:rPr>
+              <a:t>("", id = </a:t>
+            </a:r>
+            <a:r>
+              <a:rPr lang="en-US" sz="900" dirty="0" err="1" smtClean="0">
+                <a:latin typeface="Courier New" panose="02070309020205020404" pitchFamily="49" charset="0"/>
+                <a:cs typeface="Courier New" panose="02070309020205020404" pitchFamily="49" charset="0"/>
+              </a:rPr>
+              <a:t>store_nonparametric</a:t>
+            </a:r>
+            <a:r>
+              <a:rPr lang="en-US" sz="900" dirty="0">
+                <a:latin typeface="Courier New" panose="02070309020205020404" pitchFamily="49" charset="0"/>
+                <a:cs typeface="Courier New" panose="02070309020205020404" pitchFamily="49" charset="0"/>
+              </a:rPr>
+              <a:t>", </a:t>
+            </a:r>
+            <a:r>
+              <a:rPr lang="en-US" sz="900" dirty="0" smtClean="0">
+                <a:latin typeface="Courier New" panose="02070309020205020404" pitchFamily="49" charset="0"/>
+                <a:cs typeface="Courier New" panose="02070309020205020404" pitchFamily="49" charset="0"/>
+              </a:rPr>
+              <a:t>…))),</a:t>
+            </a:r>
+            <a:endParaRPr lang="en-US" sz="900" dirty="0">
+              <a:latin typeface="Courier New" panose="02070309020205020404" pitchFamily="49" charset="0"/>
+              <a:cs typeface="Courier New" panose="02070309020205020404" pitchFamily="49" charset="0"/>
+            </a:endParaRPr>
+          </a:p>
+          <a:p>
+            <a:r>
+              <a:rPr lang="en-US" sz="900" dirty="0" smtClean="0">
+                <a:latin typeface="Courier New" panose="02070309020205020404" pitchFamily="49" charset="0"/>
+                <a:cs typeface="Courier New" panose="02070309020205020404" pitchFamily="49" charset="0"/>
+              </a:rPr>
+              <a:t>column(8</a:t>
+            </a:r>
+            <a:r>
+              <a:rPr lang="en-US" sz="900" dirty="0">
+                <a:latin typeface="Courier New" panose="02070309020205020404" pitchFamily="49" charset="0"/>
+                <a:cs typeface="Courier New" panose="02070309020205020404" pitchFamily="49" charset="0"/>
+              </a:rPr>
+              <a:t>,</a:t>
+            </a:r>
+          </a:p>
+          <a:p>
+            <a:r>
+              <a:rPr lang="en-US" sz="900" dirty="0" err="1" smtClean="0">
+                <a:latin typeface="Courier New" panose="02070309020205020404" pitchFamily="49" charset="0"/>
+                <a:cs typeface="Courier New" panose="02070309020205020404" pitchFamily="49" charset="0"/>
+              </a:rPr>
+              <a:t>tags$b</a:t>
+            </a:r>
+            <a:r>
+              <a:rPr lang="en-US" sz="900" dirty="0">
+                <a:latin typeface="Courier New" panose="02070309020205020404" pitchFamily="49" charset="0"/>
+                <a:cs typeface="Courier New" panose="02070309020205020404" pitchFamily="49" charset="0"/>
+              </a:rPr>
+              <a:t>("Nonparametric Results"),</a:t>
+            </a:r>
+          </a:p>
+          <a:p>
+            <a:r>
+              <a:rPr lang="en-US" sz="900" dirty="0" err="1" smtClean="0">
+                <a:latin typeface="Courier New" panose="02070309020205020404" pitchFamily="49" charset="0"/>
+                <a:cs typeface="Courier New" panose="02070309020205020404" pitchFamily="49" charset="0"/>
+              </a:rPr>
+              <a:t>verbatimTextOutput</a:t>
+            </a:r>
+            <a:r>
+              <a:rPr lang="en-US" sz="900" dirty="0">
+                <a:latin typeface="Courier New" panose="02070309020205020404" pitchFamily="49" charset="0"/>
+                <a:cs typeface="Courier New" panose="02070309020205020404" pitchFamily="49" charset="0"/>
+              </a:rPr>
+              <a:t>("</a:t>
+            </a:r>
+            <a:r>
+              <a:rPr lang="en-US" sz="900" dirty="0" err="1">
+                <a:latin typeface="Courier New" panose="02070309020205020404" pitchFamily="49" charset="0"/>
+                <a:cs typeface="Courier New" panose="02070309020205020404" pitchFamily="49" charset="0"/>
+              </a:rPr>
+              <a:t>nonparametrictable</a:t>
+            </a:r>
+            <a:r>
+              <a:rPr lang="en-US" sz="900" dirty="0" smtClean="0">
+                <a:latin typeface="Courier New" panose="02070309020205020404" pitchFamily="49" charset="0"/>
+                <a:cs typeface="Courier New" panose="02070309020205020404" pitchFamily="49" charset="0"/>
+              </a:rPr>
+              <a:t>")))</a:t>
+            </a:r>
+            <a:endParaRPr lang="en-US" sz="900" dirty="0">
+              <a:latin typeface="Courier New" panose="02070309020205020404" pitchFamily="49" charset="0"/>
+              <a:cs typeface="Courier New" panose="02070309020205020404" pitchFamily="49" charset="0"/>
             </a:endParaRPr>
           </a:p>
         </p:txBody>
@@ -6046,6 +6754,13 @@
   <p:clrMapOvr>
     <a:masterClrMapping/>
   </p:clrMapOvr>
+  <p:timing>
+    <p:tnLst>
+      <p:par>
+        <p:cTn id="1" dur="indefinite" restart="never" nodeType="tmRoot"/>
+      </p:par>
+    </p:tnLst>
+  </p:timing>
 </p:sld>
 </file>
 

</xml_diff>

<commit_message>
New powerpoint file and image updates
</commit_message>
<xml_diff>
--- a/student-paper-competition-2014/images/images.pptx
+++ b/student-paper-competition-2014/images/images.pptx
@@ -301,7 +301,7 @@
           <a:p>
             <a:fld id="{F74648D0-5642-438F-8F02-AC3B4D73B72D}" type="datetimeFigureOut">
               <a:rPr lang="en-US" smtClean="0"/>
-              <a:t>12/6/2014</a:t>
+              <a:t>12/11/14</a:t>
             </a:fld>
             <a:endParaRPr lang="en-US"/>
           </a:p>
@@ -471,7 +471,7 @@
           <a:p>
             <a:fld id="{F74648D0-5642-438F-8F02-AC3B4D73B72D}" type="datetimeFigureOut">
               <a:rPr lang="en-US" smtClean="0"/>
-              <a:t>12/6/2014</a:t>
+              <a:t>12/11/14</a:t>
             </a:fld>
             <a:endParaRPr lang="en-US"/>
           </a:p>
@@ -651,7 +651,7 @@
           <a:p>
             <a:fld id="{F74648D0-5642-438F-8F02-AC3B4D73B72D}" type="datetimeFigureOut">
               <a:rPr lang="en-US" smtClean="0"/>
-              <a:t>12/6/2014</a:t>
+              <a:t>12/11/14</a:t>
             </a:fld>
             <a:endParaRPr lang="en-US"/>
           </a:p>
@@ -821,7 +821,7 @@
           <a:p>
             <a:fld id="{F74648D0-5642-438F-8F02-AC3B4D73B72D}" type="datetimeFigureOut">
               <a:rPr lang="en-US" smtClean="0"/>
-              <a:t>12/6/2014</a:t>
+              <a:t>12/11/14</a:t>
             </a:fld>
             <a:endParaRPr lang="en-US"/>
           </a:p>
@@ -1067,7 +1067,7 @@
           <a:p>
             <a:fld id="{F74648D0-5642-438F-8F02-AC3B4D73B72D}" type="datetimeFigureOut">
               <a:rPr lang="en-US" smtClean="0"/>
-              <a:t>12/6/2014</a:t>
+              <a:t>12/11/14</a:t>
             </a:fld>
             <a:endParaRPr lang="en-US"/>
           </a:p>
@@ -1355,7 +1355,7 @@
           <a:p>
             <a:fld id="{F74648D0-5642-438F-8F02-AC3B4D73B72D}" type="datetimeFigureOut">
               <a:rPr lang="en-US" smtClean="0"/>
-              <a:t>12/6/2014</a:t>
+              <a:t>12/11/14</a:t>
             </a:fld>
             <a:endParaRPr lang="en-US"/>
           </a:p>
@@ -1777,7 +1777,7 @@
           <a:p>
             <a:fld id="{F74648D0-5642-438F-8F02-AC3B4D73B72D}" type="datetimeFigureOut">
               <a:rPr lang="en-US" smtClean="0"/>
-              <a:t>12/6/2014</a:t>
+              <a:t>12/11/14</a:t>
             </a:fld>
             <a:endParaRPr lang="en-US"/>
           </a:p>
@@ -1895,7 +1895,7 @@
           <a:p>
             <a:fld id="{F74648D0-5642-438F-8F02-AC3B4D73B72D}" type="datetimeFigureOut">
               <a:rPr lang="en-US" smtClean="0"/>
-              <a:t>12/6/2014</a:t>
+              <a:t>12/11/14</a:t>
             </a:fld>
             <a:endParaRPr lang="en-US"/>
           </a:p>
@@ -1990,7 +1990,7 @@
           <a:p>
             <a:fld id="{F74648D0-5642-438F-8F02-AC3B4D73B72D}" type="datetimeFigureOut">
               <a:rPr lang="en-US" smtClean="0"/>
-              <a:t>12/6/2014</a:t>
+              <a:t>12/11/14</a:t>
             </a:fld>
             <a:endParaRPr lang="en-US"/>
           </a:p>
@@ -2267,7 +2267,7 @@
           <a:p>
             <a:fld id="{F74648D0-5642-438F-8F02-AC3B4D73B72D}" type="datetimeFigureOut">
               <a:rPr lang="en-US" smtClean="0"/>
-              <a:t>12/6/2014</a:t>
+              <a:t>12/11/14</a:t>
             </a:fld>
             <a:endParaRPr lang="en-US"/>
           </a:p>
@@ -2520,7 +2520,7 @@
           <a:p>
             <a:fld id="{F74648D0-5642-438F-8F02-AC3B4D73B72D}" type="datetimeFigureOut">
               <a:rPr lang="en-US" smtClean="0"/>
-              <a:t>12/6/2014</a:t>
+              <a:t>12/11/14</a:t>
             </a:fld>
             <a:endParaRPr lang="en-US"/>
           </a:p>
@@ -2733,7 +2733,7 @@
           <a:p>
             <a:fld id="{F74648D0-5642-438F-8F02-AC3B4D73B72D}" type="datetimeFigureOut">
               <a:rPr lang="en-US" smtClean="0"/>
-              <a:t>12/6/2014</a:t>
+              <a:t>12/11/14</a:t>
             </a:fld>
             <a:endParaRPr lang="en-US"/>
           </a:p>
@@ -4138,7 +4138,7 @@
         <p:spPr>
           <a:xfrm>
             <a:off x="316355" y="2912313"/>
-            <a:ext cx="1742250" cy="1194824"/>
+            <a:ext cx="2011428" cy="1195063"/>
           </a:xfrm>
           <a:custGeom>
             <a:avLst/>
@@ -4173,6 +4173,16 @@
               <a:gd name="connsiteY3" fmla="*/ 7212 h 7212"/>
               <a:gd name="connsiteX4" fmla="*/ 2684 w 13819"/>
               <a:gd name="connsiteY4" fmla="*/ 0 h 7212"/>
+              <a:gd name="connsiteX0" fmla="*/ 1942 w 11545"/>
+              <a:gd name="connsiteY0" fmla="*/ 0 h 10002"/>
+              <a:gd name="connsiteX1" fmla="*/ 9179 w 11545"/>
+              <a:gd name="connsiteY1" fmla="*/ 0 h 10002"/>
+              <a:gd name="connsiteX2" fmla="*/ 11545 w 11545"/>
+              <a:gd name="connsiteY2" fmla="*/ 10002 h 10002"/>
+              <a:gd name="connsiteX3" fmla="*/ 0 w 11545"/>
+              <a:gd name="connsiteY3" fmla="*/ 10000 h 10002"/>
+              <a:gd name="connsiteX4" fmla="*/ 1942 w 11545"/>
+              <a:gd name="connsiteY4" fmla="*/ 0 h 10002"/>
             </a:gdLst>
             <a:ahLst/>
             <a:cxnLst>
@@ -4194,21 +4204,21 @@
             </a:cxnLst>
             <a:rect l="l" t="t" r="r" b="b"/>
             <a:pathLst>
-              <a:path w="13819" h="7212">
+              <a:path w="11545" h="10002">
                 <a:moveTo>
-                  <a:pt x="2684" y="0"/>
+                  <a:pt x="1942" y="0"/>
                 </a:moveTo>
                 <a:lnTo>
-                  <a:pt x="12684" y="0"/>
+                  <a:pt x="9179" y="0"/>
                 </a:lnTo>
                 <a:lnTo>
-                  <a:pt x="13819" y="7154"/>
+                  <a:pt x="11545" y="10002"/>
                 </a:lnTo>
                 <a:lnTo>
-                  <a:pt x="0" y="7212"/>
+                  <a:pt x="0" y="10000"/>
                 </a:lnTo>
                 <a:lnTo>
-                  <a:pt x="2684" y="0"/>
+                  <a:pt x="1942" y="0"/>
                 </a:lnTo>
                 <a:close/>
               </a:path>
@@ -4298,7 +4308,7 @@
         <p:spPr>
           <a:xfrm>
             <a:off x="1915507" y="2912313"/>
-            <a:ext cx="135730" cy="1189138"/>
+            <a:ext cx="411206" cy="1193134"/>
           </a:xfrm>
           <a:prstGeom prst="line">
             <a:avLst/>
@@ -4582,8 +4592,8 @@
         </p:nvSpPr>
         <p:spPr>
           <a:xfrm>
-            <a:off x="6362232" y="2939438"/>
-            <a:ext cx="1742250" cy="1194824"/>
+            <a:off x="6365542" y="2939437"/>
+            <a:ext cx="2008292" cy="1168643"/>
           </a:xfrm>
           <a:custGeom>
             <a:avLst/>
@@ -4618,6 +4628,36 @@
               <a:gd name="connsiteY3" fmla="*/ 7212 h 7212"/>
               <a:gd name="connsiteX4" fmla="*/ 2684 w 13819"/>
               <a:gd name="connsiteY4" fmla="*/ 0 h 7212"/>
+              <a:gd name="connsiteX0" fmla="*/ 1942 w 11546"/>
+              <a:gd name="connsiteY0" fmla="*/ 0 h 10000"/>
+              <a:gd name="connsiteX1" fmla="*/ 9179 w 11546"/>
+              <a:gd name="connsiteY1" fmla="*/ 0 h 10000"/>
+              <a:gd name="connsiteX2" fmla="*/ 11546 w 11546"/>
+              <a:gd name="connsiteY2" fmla="*/ 9781 h 10000"/>
+              <a:gd name="connsiteX3" fmla="*/ 0 w 11546"/>
+              <a:gd name="connsiteY3" fmla="*/ 10000 h 10000"/>
+              <a:gd name="connsiteX4" fmla="*/ 1942 w 11546"/>
+              <a:gd name="connsiteY4" fmla="*/ 0 h 10000"/>
+              <a:gd name="connsiteX0" fmla="*/ 1923 w 11527"/>
+              <a:gd name="connsiteY0" fmla="*/ 0 h 9833"/>
+              <a:gd name="connsiteX1" fmla="*/ 9160 w 11527"/>
+              <a:gd name="connsiteY1" fmla="*/ 0 h 9833"/>
+              <a:gd name="connsiteX2" fmla="*/ 11527 w 11527"/>
+              <a:gd name="connsiteY2" fmla="*/ 9781 h 9833"/>
+              <a:gd name="connsiteX3" fmla="*/ 0 w 11527"/>
+              <a:gd name="connsiteY3" fmla="*/ 9833 h 9833"/>
+              <a:gd name="connsiteX4" fmla="*/ 1923 w 11527"/>
+              <a:gd name="connsiteY4" fmla="*/ 0 h 9833"/>
+              <a:gd name="connsiteX0" fmla="*/ 1668 w 10000"/>
+              <a:gd name="connsiteY0" fmla="*/ 0 h 9947"/>
+              <a:gd name="connsiteX1" fmla="*/ 7947 w 10000"/>
+              <a:gd name="connsiteY1" fmla="*/ 0 h 9947"/>
+              <a:gd name="connsiteX2" fmla="*/ 10000 w 10000"/>
+              <a:gd name="connsiteY2" fmla="*/ 9947 h 9947"/>
+              <a:gd name="connsiteX3" fmla="*/ 0 w 10000"/>
+              <a:gd name="connsiteY3" fmla="*/ 9887 h 9947"/>
+              <a:gd name="connsiteX4" fmla="*/ 1668 w 10000"/>
+              <a:gd name="connsiteY4" fmla="*/ 0 h 9947"/>
             </a:gdLst>
             <a:ahLst/>
             <a:cxnLst>
@@ -4639,21 +4679,21 @@
             </a:cxnLst>
             <a:rect l="l" t="t" r="r" b="b"/>
             <a:pathLst>
-              <a:path w="13819" h="7212">
+              <a:path w="10000" h="9947">
                 <a:moveTo>
-                  <a:pt x="2684" y="0"/>
+                  <a:pt x="1668" y="0"/>
                 </a:moveTo>
                 <a:lnTo>
-                  <a:pt x="12684" y="0"/>
+                  <a:pt x="7947" y="0"/>
                 </a:lnTo>
                 <a:lnTo>
-                  <a:pt x="13819" y="7154"/>
+                  <a:pt x="10000" y="9947"/>
                 </a:lnTo>
                 <a:lnTo>
-                  <a:pt x="0" y="7212"/>
+                  <a:pt x="0" y="9887"/>
                 </a:lnTo>
                 <a:lnTo>
-                  <a:pt x="2684" y="0"/>
+                  <a:pt x="1668" y="0"/>
                 </a:lnTo>
                 <a:close/>
               </a:path>
@@ -4743,7 +4783,7 @@
         <p:spPr>
           <a:xfrm>
             <a:off x="7961384" y="2939438"/>
-            <a:ext cx="135730" cy="1189138"/>
+            <a:ext cx="413378" cy="1166552"/>
           </a:xfrm>
           <a:prstGeom prst="line">
             <a:avLst/>
@@ -5318,10 +5358,6 @@
               </a:rPr>
               <a:t>}</a:t>
             </a:r>
-            <a:endParaRPr lang="en-US" sz="900" dirty="0">
-              <a:latin typeface="Courier New" panose="02070309020205020404" pitchFamily="49" charset="0"/>
-              <a:cs typeface="Courier New" panose="02070309020205020404" pitchFamily="49" charset="0"/>
-            </a:endParaRPr>
           </a:p>
         </p:txBody>
       </p:sp>
@@ -5881,7 +5917,7 @@
   <p:timing>
     <p:tnLst>
       <p:par>
-        <p:cTn id="1" dur="indefinite" restart="never" nodeType="tmRoot"/>
+        <p:cTn xmlns:p14="http://schemas.microsoft.com/office/powerpoint/2010/main" id="1" dur="indefinite" restart="never" nodeType="tmRoot"/>
       </p:par>
     </p:tnLst>
   </p:timing>
@@ -6757,7 +6793,7 @@
   <p:timing>
     <p:tnLst>
       <p:par>
-        <p:cTn id="1" dur="indefinite" restart="never" nodeType="tmRoot"/>
+        <p:cTn xmlns:p14="http://schemas.microsoft.com/office/powerpoint/2010/main" id="1" dur="indefinite" restart="never" nodeType="tmRoot"/>
       </p:par>
     </p:tnLst>
   </p:timing>

</xml_diff>

<commit_message>
New user experience image
</commit_message>
<xml_diff>
--- a/student-paper-competition-2014/images/images.pptx
+++ b/student-paper-competition-2014/images/images.pptx
@@ -7,6 +7,7 @@
   <p:sldIdLst>
     <p:sldId id="256" r:id="rId2"/>
     <p:sldId id="257" r:id="rId3"/>
+    <p:sldId id="258" r:id="rId4"/>
   </p:sldIdLst>
   <p:sldSz cx="9144000" cy="6858000" type="screen4x3"/>
   <p:notesSz cx="6858000" cy="9144000"/>
@@ -112,6 +113,7 @@
           <p14:sldIdLst>
             <p14:sldId id="256"/>
             <p14:sldId id="257"/>
+            <p14:sldId id="258"/>
           </p14:sldIdLst>
         </p14:section>
       </p14:sectionLst>
@@ -6800,6 +6802,884 @@
 </p:sld>
 </file>
 
+<file path=ppt/slides/slide3.xml><?xml version="1.0" encoding="utf-8"?>
+<p:sld xmlns:a="http://schemas.openxmlformats.org/drawingml/2006/main" xmlns:r="http://schemas.openxmlformats.org/officeDocument/2006/relationships" xmlns:p="http://schemas.openxmlformats.org/presentationml/2006/main">
+  <p:cSld>
+    <p:spTree>
+      <p:nvGrpSpPr>
+        <p:cNvPr id="1" name=""/>
+        <p:cNvGrpSpPr/>
+        <p:nvPr/>
+      </p:nvGrpSpPr>
+      <p:grpSpPr>
+        <a:xfrm>
+          <a:off x="0" y="0"/>
+          <a:ext cx="0" cy="0"/>
+          <a:chOff x="0" y="0"/>
+          <a:chExt cx="0" cy="0"/>
+        </a:xfrm>
+      </p:grpSpPr>
+      <p:sp>
+        <p:nvSpPr>
+          <p:cNvPr id="21" name="Rectangle 20"/>
+          <p:cNvSpPr/>
+          <p:nvPr/>
+        </p:nvSpPr>
+        <p:spPr>
+          <a:xfrm>
+            <a:off x="0" y="2774121"/>
+            <a:ext cx="2640022" cy="2122366"/>
+          </a:xfrm>
+          <a:prstGeom prst="rect">
+            <a:avLst/>
+          </a:prstGeom>
+          <a:noFill/>
+          <a:ln>
+            <a:solidFill>
+              <a:srgbClr val="595959"/>
+            </a:solidFill>
+            <a:prstDash val="sysDash"/>
+          </a:ln>
+          <a:effectLst/>
+        </p:spPr>
+        <p:style>
+          <a:lnRef idx="1">
+            <a:schemeClr val="accent1"/>
+          </a:lnRef>
+          <a:fillRef idx="3">
+            <a:schemeClr val="accent1"/>
+          </a:fillRef>
+          <a:effectRef idx="2">
+            <a:schemeClr val="accent1"/>
+          </a:effectRef>
+          <a:fontRef idx="minor">
+            <a:schemeClr val="lt1"/>
+          </a:fontRef>
+        </p:style>
+        <p:txBody>
+          <a:bodyPr rtlCol="0" anchor="ctr"/>
+          <a:lstStyle/>
+          <a:p>
+            <a:pPr algn="ctr"/>
+            <a:endParaRPr lang="en-US"/>
+          </a:p>
+        </p:txBody>
+      </p:sp>
+      <p:pic>
+        <p:nvPicPr>
+          <p:cNvPr id="4" name="Picture 3" descr="Screen Shot 2014-12-11 at 5.18.33 PM.png"/>
+          <p:cNvPicPr>
+            <a:picLocks noChangeAspect="1"/>
+          </p:cNvPicPr>
+          <p:nvPr/>
+        </p:nvPicPr>
+        <p:blipFill>
+          <a:blip r:embed="rId2">
+            <a:extLst>
+              <a:ext uri="{28A0092B-C50C-407E-A947-70E740481C1C}">
+                <a14:useLocalDpi xmlns:a14="http://schemas.microsoft.com/office/drawing/2010/main" val="0"/>
+              </a:ext>
+            </a:extLst>
+          </a:blip>
+          <a:stretch>
+            <a:fillRect/>
+          </a:stretch>
+        </p:blipFill>
+        <p:spPr>
+          <a:xfrm>
+            <a:off x="111927" y="3066712"/>
+            <a:ext cx="2336800" cy="444500"/>
+          </a:xfrm>
+          <a:prstGeom prst="rect">
+            <a:avLst/>
+          </a:prstGeom>
+        </p:spPr>
+      </p:pic>
+      <p:sp>
+        <p:nvSpPr>
+          <p:cNvPr id="13" name="7-Point Star 12"/>
+          <p:cNvSpPr/>
+          <p:nvPr/>
+        </p:nvSpPr>
+        <p:spPr>
+          <a:xfrm>
+            <a:off x="1988371" y="3125063"/>
+            <a:ext cx="300762" cy="317519"/>
+          </a:xfrm>
+          <a:prstGeom prst="star7">
+            <a:avLst/>
+          </a:prstGeom>
+          <a:noFill/>
+          <a:ln>
+            <a:solidFill>
+              <a:schemeClr val="accent2"/>
+            </a:solidFill>
+          </a:ln>
+          <a:effectLst>
+            <a:glow rad="63500">
+              <a:schemeClr val="accent2">
+                <a:satMod val="175000"/>
+                <a:alpha val="40000"/>
+              </a:schemeClr>
+            </a:glow>
+            <a:outerShdw blurRad="40000" dist="23000" dir="5400000" rotWithShape="0">
+              <a:srgbClr val="000000">
+                <a:alpha val="35000"/>
+              </a:srgbClr>
+            </a:outerShdw>
+          </a:effectLst>
+        </p:spPr>
+        <p:style>
+          <a:lnRef idx="1">
+            <a:schemeClr val="accent1"/>
+          </a:lnRef>
+          <a:fillRef idx="3">
+            <a:schemeClr val="accent1"/>
+          </a:fillRef>
+          <a:effectRef idx="2">
+            <a:schemeClr val="accent1"/>
+          </a:effectRef>
+          <a:fontRef idx="minor">
+            <a:schemeClr val="lt1"/>
+          </a:fontRef>
+        </p:style>
+        <p:txBody>
+          <a:bodyPr rtlCol="0" anchor="ctr"/>
+          <a:lstStyle/>
+          <a:p>
+            <a:pPr algn="ctr"/>
+            <a:endParaRPr lang="en-US"/>
+          </a:p>
+        </p:txBody>
+      </p:sp>
+      <p:cxnSp>
+        <p:nvCxnSpPr>
+          <p:cNvPr id="7" name="Straight Arrow Connector 6"/>
+          <p:cNvCxnSpPr/>
+          <p:nvPr/>
+        </p:nvCxnSpPr>
+        <p:spPr>
+          <a:xfrm flipH="1" flipV="1">
+            <a:off x="2122045" y="3258758"/>
+            <a:ext cx="133670" cy="284095"/>
+          </a:xfrm>
+          <a:prstGeom prst="straightConnector1">
+            <a:avLst/>
+          </a:prstGeom>
+          <a:ln w="57150" cap="rnd">
+            <a:solidFill>
+              <a:schemeClr val="tx1"/>
+            </a:solidFill>
+            <a:tailEnd type="stealth" w="lg" len="lg"/>
+          </a:ln>
+          <a:effectLst>
+            <a:glow rad="50800">
+              <a:schemeClr val="bg1">
+                <a:alpha val="55000"/>
+              </a:schemeClr>
+            </a:glow>
+            <a:outerShdw blurRad="40000" dist="20000" dir="5400000" rotWithShape="0">
+              <a:srgbClr val="000000">
+                <a:alpha val="38000"/>
+              </a:srgbClr>
+            </a:outerShdw>
+          </a:effectLst>
+        </p:spPr>
+        <p:style>
+          <a:lnRef idx="2">
+            <a:schemeClr val="accent1"/>
+          </a:lnRef>
+          <a:fillRef idx="0">
+            <a:schemeClr val="accent1"/>
+          </a:fillRef>
+          <a:effectRef idx="1">
+            <a:schemeClr val="accent1"/>
+          </a:effectRef>
+          <a:fontRef idx="minor">
+            <a:schemeClr val="tx1"/>
+          </a:fontRef>
+        </p:style>
+      </p:cxnSp>
+      <p:sp>
+        <p:nvSpPr>
+          <p:cNvPr id="15" name="Decision 14"/>
+          <p:cNvSpPr/>
+          <p:nvPr/>
+        </p:nvSpPr>
+        <p:spPr>
+          <a:xfrm>
+            <a:off x="467852" y="3877083"/>
+            <a:ext cx="1654191" cy="718597"/>
+          </a:xfrm>
+          <a:prstGeom prst="flowChartDecision">
+            <a:avLst/>
+          </a:prstGeom>
+          <a:solidFill>
+            <a:schemeClr val="tx1">
+              <a:lumMod val="50000"/>
+              <a:lumOff val="50000"/>
+            </a:schemeClr>
+          </a:solidFill>
+          <a:ln>
+            <a:solidFill>
+              <a:schemeClr val="bg1"/>
+            </a:solidFill>
+          </a:ln>
+          <a:effectLst/>
+        </p:spPr>
+        <p:style>
+          <a:lnRef idx="1">
+            <a:schemeClr val="accent1"/>
+          </a:lnRef>
+          <a:fillRef idx="3">
+            <a:schemeClr val="accent1"/>
+          </a:fillRef>
+          <a:effectRef idx="2">
+            <a:schemeClr val="accent1"/>
+          </a:effectRef>
+          <a:fontRef idx="minor">
+            <a:schemeClr val="lt1"/>
+          </a:fontRef>
+        </p:style>
+        <p:txBody>
+          <a:bodyPr rtlCol="0" anchor="ctr"/>
+          <a:lstStyle/>
+          <a:p>
+            <a:pPr algn="ctr"/>
+            <a:r>
+              <a:rPr lang="en-US" sz="1400" dirty="0" smtClean="0">
+                <a:latin typeface="Cambria Math"/>
+                <a:cs typeface="Cambria Math"/>
+              </a:rPr>
+              <a:t>Options</a:t>
+            </a:r>
+            <a:endParaRPr lang="en-US" sz="1400" dirty="0">
+              <a:latin typeface="Cambria Math"/>
+              <a:cs typeface="Cambria Math"/>
+            </a:endParaRPr>
+          </a:p>
+        </p:txBody>
+      </p:sp>
+      <p:pic>
+        <p:nvPicPr>
+          <p:cNvPr id="16" name="Picture 15"/>
+          <p:cNvPicPr>
+            <a:picLocks noChangeAspect="1"/>
+          </p:cNvPicPr>
+          <p:nvPr/>
+        </p:nvPicPr>
+        <p:blipFill rotWithShape="1">
+          <a:blip r:embed="rId3"/>
+          <a:srcRect l="20832" r="22339"/>
+          <a:stretch/>
+        </p:blipFill>
+        <p:spPr>
+          <a:xfrm>
+            <a:off x="3325091" y="2578862"/>
+            <a:ext cx="1492694" cy="1371600"/>
+          </a:xfrm>
+          <a:prstGeom prst="rect">
+            <a:avLst/>
+          </a:prstGeom>
+        </p:spPr>
+      </p:pic>
+      <p:pic>
+        <p:nvPicPr>
+          <p:cNvPr id="18" name="Picture 17"/>
+          <p:cNvPicPr>
+            <a:picLocks noChangeAspect="1"/>
+          </p:cNvPicPr>
+          <p:nvPr/>
+        </p:nvPicPr>
+        <p:blipFill>
+          <a:blip r:embed="rId4"/>
+          <a:stretch>
+            <a:fillRect/>
+          </a:stretch>
+        </p:blipFill>
+        <p:spPr>
+          <a:xfrm>
+            <a:off x="6328319" y="2946458"/>
+            <a:ext cx="914400" cy="914400"/>
+          </a:xfrm>
+          <a:prstGeom prst="rect">
+            <a:avLst/>
+          </a:prstGeom>
+        </p:spPr>
+      </p:pic>
+      <p:sp>
+        <p:nvSpPr>
+          <p:cNvPr id="19" name="Snip Single Corner Rectangle 18"/>
+          <p:cNvSpPr/>
+          <p:nvPr/>
+        </p:nvSpPr>
+        <p:spPr>
+          <a:xfrm>
+            <a:off x="8187410" y="2874385"/>
+            <a:ext cx="2640022" cy="2373039"/>
+          </a:xfrm>
+          <a:prstGeom prst="snip1Rect">
+            <a:avLst/>
+          </a:prstGeom>
+          <a:solidFill>
+            <a:schemeClr val="bg1"/>
+          </a:solidFill>
+          <a:ln>
+            <a:solidFill>
+              <a:schemeClr val="tx1">
+                <a:lumMod val="65000"/>
+                <a:lumOff val="35000"/>
+              </a:schemeClr>
+            </a:solidFill>
+          </a:ln>
+        </p:spPr>
+        <p:style>
+          <a:lnRef idx="1">
+            <a:schemeClr val="accent1"/>
+          </a:lnRef>
+          <a:fillRef idx="3">
+            <a:schemeClr val="accent1"/>
+          </a:fillRef>
+          <a:effectRef idx="2">
+            <a:schemeClr val="accent1"/>
+          </a:effectRef>
+          <a:fontRef idx="minor">
+            <a:schemeClr val="lt1"/>
+          </a:fontRef>
+        </p:style>
+        <p:txBody>
+          <a:bodyPr rtlCol="0" anchor="ctr"/>
+          <a:lstStyle/>
+          <a:p>
+            <a:endParaRPr lang="en-US" sz="1100" dirty="0">
+              <a:solidFill>
+                <a:schemeClr val="tx1"/>
+              </a:solidFill>
+              <a:latin typeface="Courier New"/>
+              <a:cs typeface="Courier New"/>
+            </a:endParaRPr>
+          </a:p>
+        </p:txBody>
+      </p:sp>
+      <p:sp>
+        <p:nvSpPr>
+          <p:cNvPr id="20" name="TextBox 19"/>
+          <p:cNvSpPr txBox="1"/>
+          <p:nvPr/>
+        </p:nvSpPr>
+        <p:spPr>
+          <a:xfrm>
+            <a:off x="8137283" y="2824251"/>
+            <a:ext cx="2773694" cy="2631489"/>
+          </a:xfrm>
+          <a:prstGeom prst="rect">
+            <a:avLst/>
+          </a:prstGeom>
+          <a:noFill/>
+        </p:spPr>
+        <p:txBody>
+          <a:bodyPr wrap="square" rtlCol="0">
+            <a:spAutoFit/>
+          </a:bodyPr>
+          <a:lstStyle/>
+          <a:p>
+            <a:r>
+              <a:rPr lang="en-US" sz="1100" dirty="0" err="1">
+                <a:latin typeface="Courier New"/>
+                <a:cs typeface="Courier New"/>
+              </a:rPr>
+              <a:t>ggplot</a:t>
+            </a:r>
+            <a:r>
+              <a:rPr lang="en-US" sz="1100" dirty="0">
+                <a:latin typeface="Courier New"/>
+                <a:cs typeface="Courier New"/>
+              </a:rPr>
+              <a:t>(</a:t>
+            </a:r>
+            <a:r>
+              <a:rPr lang="en-US" sz="1100" dirty="0" err="1">
+                <a:latin typeface="Courier New"/>
+                <a:cs typeface="Courier New"/>
+              </a:rPr>
+              <a:t>plot_data</a:t>
+            </a:r>
+            <a:r>
+              <a:rPr lang="en-US" sz="1100" dirty="0">
+                <a:latin typeface="Courier New"/>
+                <a:cs typeface="Courier New"/>
+              </a:rPr>
+              <a:t>, </a:t>
+            </a:r>
+            <a:r>
+              <a:rPr lang="en-US" sz="1100" dirty="0" err="1">
+                <a:latin typeface="Courier New"/>
+                <a:cs typeface="Courier New"/>
+              </a:rPr>
+              <a:t>aes</a:t>
+            </a:r>
+            <a:r>
+              <a:rPr lang="en-US" sz="1100" dirty="0">
+                <a:latin typeface="Courier New"/>
+                <a:cs typeface="Courier New"/>
+              </a:rPr>
+              <a:t>(</a:t>
+            </a:r>
+            <a:r>
+              <a:rPr lang="en-US" sz="1100" dirty="0" err="1">
+                <a:latin typeface="Courier New"/>
+                <a:cs typeface="Courier New"/>
+              </a:rPr>
+              <a:t>x_center</a:t>
+            </a:r>
+            <a:r>
+              <a:rPr lang="en-US" sz="1100" dirty="0">
+                <a:latin typeface="Courier New"/>
+                <a:cs typeface="Courier New"/>
+              </a:rPr>
+              <a:t>, </a:t>
+            </a:r>
+            <a:r>
+              <a:rPr lang="en-US" sz="1100" dirty="0" err="1">
+                <a:latin typeface="Courier New"/>
+                <a:cs typeface="Courier New"/>
+              </a:rPr>
+              <a:t>y_height</a:t>
+            </a:r>
+            <a:r>
+              <a:rPr lang="en-US" sz="1100" dirty="0">
+                <a:latin typeface="Courier New"/>
+                <a:cs typeface="Courier New"/>
+              </a:rPr>
+              <a:t>)) + </a:t>
+            </a:r>
+            <a:r>
+              <a:rPr lang="en-US" sz="1100" dirty="0" err="1">
+                <a:latin typeface="Courier New"/>
+                <a:cs typeface="Courier New"/>
+              </a:rPr>
+              <a:t>geom_bar</a:t>
+            </a:r>
+            <a:r>
+              <a:rPr lang="en-US" sz="1100" dirty="0">
+                <a:latin typeface="Courier New"/>
+                <a:cs typeface="Courier New"/>
+              </a:rPr>
+              <a:t>(stat = "identity", </a:t>
+            </a:r>
+            <a:r>
+              <a:rPr lang="en-US" sz="1100" dirty="0" err="1">
+                <a:latin typeface="Courier New"/>
+                <a:cs typeface="Courier New"/>
+              </a:rPr>
+              <a:t>aes_string</a:t>
+            </a:r>
+            <a:r>
+              <a:rPr lang="en-US" sz="1100" dirty="0">
+                <a:latin typeface="Courier New"/>
+                <a:cs typeface="Courier New"/>
+              </a:rPr>
+              <a:t>(width = "</a:t>
+            </a:r>
+            <a:r>
+              <a:rPr lang="en-US" sz="1100" dirty="0" err="1">
+                <a:latin typeface="Courier New"/>
+                <a:cs typeface="Courier New"/>
+              </a:rPr>
+              <a:t>margin_x</a:t>
+            </a:r>
+            <a:r>
+              <a:rPr lang="en-US" sz="1100" dirty="0">
+                <a:latin typeface="Courier New"/>
+                <a:cs typeface="Courier New"/>
+              </a:rPr>
+              <a:t>", </a:t>
+            </a:r>
+          </a:p>
+          <a:p>
+            <a:r>
+              <a:rPr lang="en-US" sz="1100" dirty="0">
+                <a:latin typeface="Courier New"/>
+                <a:cs typeface="Courier New"/>
+              </a:rPr>
+              <a:t>    fill = "</a:t>
+            </a:r>
+            <a:r>
+              <a:rPr lang="en-US" sz="1100" dirty="0" err="1">
+                <a:latin typeface="Courier New"/>
+                <a:cs typeface="Courier New"/>
+              </a:rPr>
+              <a:t>drv</a:t>
+            </a:r>
+            <a:r>
+              <a:rPr lang="en-US" sz="1100" dirty="0">
+                <a:latin typeface="Courier New"/>
+                <a:cs typeface="Courier New"/>
+              </a:rPr>
+              <a:t>"), col = "Black") + </a:t>
+            </a:r>
+            <a:r>
+              <a:rPr lang="en-US" sz="1100" dirty="0" err="1">
+                <a:latin typeface="Courier New"/>
+                <a:cs typeface="Courier New"/>
+              </a:rPr>
+              <a:t>geom_text</a:t>
+            </a:r>
+            <a:r>
+              <a:rPr lang="en-US" sz="1100" dirty="0">
+                <a:latin typeface="Courier New"/>
+                <a:cs typeface="Courier New"/>
+              </a:rPr>
+              <a:t>(</a:t>
+            </a:r>
+            <a:r>
+              <a:rPr lang="en-US" sz="1100" dirty="0" err="1">
+                <a:latin typeface="Courier New"/>
+                <a:cs typeface="Courier New"/>
+              </a:rPr>
+              <a:t>aes_string</a:t>
+            </a:r>
+            <a:r>
+              <a:rPr lang="en-US" sz="1100" dirty="0">
+                <a:latin typeface="Courier New"/>
+                <a:cs typeface="Courier New"/>
+              </a:rPr>
+              <a:t>(label = "class", x = "</a:t>
+            </a:r>
+            <a:r>
+              <a:rPr lang="en-US" sz="1100" dirty="0" err="1">
+                <a:latin typeface="Courier New"/>
+                <a:cs typeface="Courier New"/>
+              </a:rPr>
+              <a:t>x_center</a:t>
+            </a:r>
+            <a:r>
+              <a:rPr lang="en-US" sz="1100" dirty="0">
+                <a:latin typeface="Courier New"/>
+                <a:cs typeface="Courier New"/>
+              </a:rPr>
+              <a:t>", </a:t>
+            </a:r>
+          </a:p>
+          <a:p>
+            <a:r>
+              <a:rPr lang="en-US" sz="1100" dirty="0">
+                <a:latin typeface="Courier New"/>
+                <a:cs typeface="Courier New"/>
+              </a:rPr>
+              <a:t>    y = "1.05"), angle = 45, </a:t>
+            </a:r>
+            <a:r>
+              <a:rPr lang="en-US" sz="1100" dirty="0" err="1">
+                <a:latin typeface="Courier New"/>
+                <a:cs typeface="Courier New"/>
+              </a:rPr>
+              <a:t>hjust</a:t>
+            </a:r>
+            <a:r>
+              <a:rPr lang="en-US" sz="1100" dirty="0">
+                <a:latin typeface="Courier New"/>
+                <a:cs typeface="Courier New"/>
+              </a:rPr>
+              <a:t> = 0) + </a:t>
+            </a:r>
+            <a:r>
+              <a:rPr lang="en-US" sz="1100" dirty="0" err="1">
+                <a:latin typeface="Courier New"/>
+                <a:cs typeface="Courier New"/>
+              </a:rPr>
+              <a:t>xlim</a:t>
+            </a:r>
+            <a:r>
+              <a:rPr lang="en-US" sz="1100" dirty="0">
+                <a:latin typeface="Courier New"/>
+                <a:cs typeface="Courier New"/>
+              </a:rPr>
+              <a:t>(c(0, 1.2)) + </a:t>
+            </a:r>
+            <a:r>
+              <a:rPr lang="en-US" sz="1100" dirty="0" err="1">
+                <a:latin typeface="Courier New"/>
+                <a:cs typeface="Courier New"/>
+              </a:rPr>
+              <a:t>ylim</a:t>
+            </a:r>
+            <a:r>
+              <a:rPr lang="en-US" sz="1100" dirty="0">
+                <a:latin typeface="Courier New"/>
+                <a:cs typeface="Courier New"/>
+              </a:rPr>
+              <a:t>(c(0, 1.2)) + </a:t>
+            </a:r>
+            <a:r>
+              <a:rPr lang="en-US" sz="1100" dirty="0" err="1">
+                <a:latin typeface="Courier New"/>
+                <a:cs typeface="Courier New"/>
+              </a:rPr>
+              <a:t>xlab</a:t>
+            </a:r>
+            <a:r>
+              <a:rPr lang="en-US" sz="1100" dirty="0">
+                <a:latin typeface="Courier New"/>
+                <a:cs typeface="Courier New"/>
+              </a:rPr>
+              <a:t>("class") + </a:t>
+            </a:r>
+          </a:p>
+          <a:p>
+            <a:r>
+              <a:rPr lang="en-US" sz="1100" dirty="0">
+                <a:latin typeface="Courier New"/>
+                <a:cs typeface="Courier New"/>
+              </a:rPr>
+              <a:t>    </a:t>
+            </a:r>
+            <a:r>
+              <a:rPr lang="en-US" sz="1100" dirty="0" err="1">
+                <a:latin typeface="Courier New"/>
+                <a:cs typeface="Courier New"/>
+              </a:rPr>
+              <a:t>ylab</a:t>
+            </a:r>
+            <a:r>
+              <a:rPr lang="en-US" sz="1100" dirty="0">
+                <a:latin typeface="Courier New"/>
+                <a:cs typeface="Courier New"/>
+              </a:rPr>
+              <a:t>("</a:t>
+            </a:r>
+            <a:r>
+              <a:rPr lang="en-US" sz="1100" dirty="0" err="1">
+                <a:latin typeface="Courier New"/>
+                <a:cs typeface="Courier New"/>
+              </a:rPr>
+              <a:t>drv</a:t>
+            </a:r>
+            <a:r>
+              <a:rPr lang="en-US" sz="1100" dirty="0">
+                <a:latin typeface="Courier New"/>
+                <a:cs typeface="Courier New"/>
+              </a:rPr>
+              <a:t>") + </a:t>
+            </a:r>
+            <a:r>
+              <a:rPr lang="en-US" sz="1100" dirty="0" err="1">
+                <a:latin typeface="Courier New"/>
+                <a:cs typeface="Courier New"/>
+              </a:rPr>
+              <a:t>theme_bw</a:t>
+            </a:r>
+            <a:r>
+              <a:rPr lang="en-US" sz="1100" dirty="0">
+                <a:latin typeface="Courier New"/>
+                <a:cs typeface="Courier New"/>
+              </a:rPr>
+              <a:t>() + </a:t>
+            </a:r>
+            <a:r>
+              <a:rPr lang="en-US" sz="1100" dirty="0" err="1">
+                <a:latin typeface="Courier New"/>
+                <a:cs typeface="Courier New"/>
+              </a:rPr>
+              <a:t>coord_fixed</a:t>
+            </a:r>
+            <a:r>
+              <a:rPr lang="en-US" sz="1100" dirty="0">
+                <a:latin typeface="Courier New"/>
+                <a:cs typeface="Courier New"/>
+              </a:rPr>
+              <a:t>()</a:t>
+            </a:r>
+          </a:p>
+          <a:p>
+            <a:endParaRPr lang="en-US" sz="1100" dirty="0"/>
+          </a:p>
+        </p:txBody>
+      </p:sp>
+      <p:sp>
+        <p:nvSpPr>
+          <p:cNvPr id="22" name="Curved Down Arrow 21"/>
+          <p:cNvSpPr/>
+          <p:nvPr/>
+        </p:nvSpPr>
+        <p:spPr>
+          <a:xfrm>
+            <a:off x="1219757" y="1286789"/>
+            <a:ext cx="3191419" cy="1286789"/>
+          </a:xfrm>
+          <a:prstGeom prst="curvedDownArrow">
+            <a:avLst/>
+          </a:prstGeom>
+          <a:solidFill>
+            <a:schemeClr val="tx1">
+              <a:lumMod val="65000"/>
+              <a:lumOff val="35000"/>
+              <a:alpha val="38000"/>
+            </a:schemeClr>
+          </a:solidFill>
+          <a:ln>
+            <a:solidFill>
+              <a:schemeClr val="bg1"/>
+            </a:solidFill>
+          </a:ln>
+          <a:effectLst/>
+        </p:spPr>
+        <p:style>
+          <a:lnRef idx="1">
+            <a:schemeClr val="accent1"/>
+          </a:lnRef>
+          <a:fillRef idx="3">
+            <a:schemeClr val="accent1"/>
+          </a:fillRef>
+          <a:effectRef idx="2">
+            <a:schemeClr val="accent1"/>
+          </a:effectRef>
+          <a:fontRef idx="minor">
+            <a:schemeClr val="lt1"/>
+          </a:fontRef>
+        </p:style>
+        <p:txBody>
+          <a:bodyPr rtlCol="0" anchor="ctr"/>
+          <a:lstStyle/>
+          <a:p>
+            <a:pPr algn="ctr"/>
+            <a:endParaRPr lang="en-US">
+              <a:solidFill>
+                <a:schemeClr val="tx1"/>
+              </a:solidFill>
+            </a:endParaRPr>
+          </a:p>
+        </p:txBody>
+      </p:sp>
+      <p:sp>
+        <p:nvSpPr>
+          <p:cNvPr id="24" name="Curved Down Arrow 23"/>
+          <p:cNvSpPr/>
+          <p:nvPr/>
+        </p:nvSpPr>
+        <p:spPr>
+          <a:xfrm rot="10800000">
+            <a:off x="3895216" y="4046192"/>
+            <a:ext cx="3191419" cy="1286789"/>
+          </a:xfrm>
+          <a:prstGeom prst="curvedDownArrow">
+            <a:avLst/>
+          </a:prstGeom>
+          <a:solidFill>
+            <a:schemeClr val="tx1">
+              <a:lumMod val="65000"/>
+              <a:lumOff val="35000"/>
+              <a:alpha val="38000"/>
+            </a:schemeClr>
+          </a:solidFill>
+          <a:ln>
+            <a:solidFill>
+              <a:schemeClr val="bg1"/>
+            </a:solidFill>
+          </a:ln>
+          <a:effectLst/>
+          <a:scene3d>
+            <a:camera prst="orthographicFront">
+              <a:rot lat="0" lon="10800000" rev="0"/>
+            </a:camera>
+            <a:lightRig rig="threePt" dir="t"/>
+          </a:scene3d>
+        </p:spPr>
+        <p:style>
+          <a:lnRef idx="1">
+            <a:schemeClr val="accent1"/>
+          </a:lnRef>
+          <a:fillRef idx="3">
+            <a:schemeClr val="accent1"/>
+          </a:fillRef>
+          <a:effectRef idx="2">
+            <a:schemeClr val="accent1"/>
+          </a:effectRef>
+          <a:fontRef idx="minor">
+            <a:schemeClr val="lt1"/>
+          </a:fontRef>
+        </p:style>
+        <p:txBody>
+          <a:bodyPr rtlCol="0" anchor="ctr"/>
+          <a:lstStyle/>
+          <a:p>
+            <a:pPr algn="ctr"/>
+            <a:endParaRPr lang="en-US">
+              <a:solidFill>
+                <a:schemeClr val="tx1"/>
+              </a:solidFill>
+            </a:endParaRPr>
+          </a:p>
+        </p:txBody>
+      </p:sp>
+      <p:sp>
+        <p:nvSpPr>
+          <p:cNvPr id="25" name="Curved Down Arrow 24"/>
+          <p:cNvSpPr/>
+          <p:nvPr/>
+        </p:nvSpPr>
+        <p:spPr>
+          <a:xfrm>
+            <a:off x="6568656" y="1439189"/>
+            <a:ext cx="3191419" cy="1286789"/>
+          </a:xfrm>
+          <a:prstGeom prst="curvedDownArrow">
+            <a:avLst/>
+          </a:prstGeom>
+          <a:solidFill>
+            <a:schemeClr val="tx1">
+              <a:lumMod val="65000"/>
+              <a:lumOff val="35000"/>
+              <a:alpha val="38000"/>
+            </a:schemeClr>
+          </a:solidFill>
+          <a:ln>
+            <a:solidFill>
+              <a:schemeClr val="bg1"/>
+            </a:solidFill>
+          </a:ln>
+          <a:effectLst/>
+        </p:spPr>
+        <p:style>
+          <a:lnRef idx="1">
+            <a:schemeClr val="accent1"/>
+          </a:lnRef>
+          <a:fillRef idx="3">
+            <a:schemeClr val="accent1"/>
+          </a:fillRef>
+          <a:effectRef idx="2">
+            <a:schemeClr val="accent1"/>
+          </a:effectRef>
+          <a:fontRef idx="minor">
+            <a:schemeClr val="lt1"/>
+          </a:fontRef>
+        </p:style>
+        <p:txBody>
+          <a:bodyPr rtlCol="0" anchor="ctr"/>
+          <a:lstStyle/>
+          <a:p>
+            <a:pPr algn="ctr"/>
+            <a:endParaRPr lang="en-US">
+              <a:solidFill>
+                <a:schemeClr val="tx1"/>
+              </a:solidFill>
+            </a:endParaRPr>
+          </a:p>
+        </p:txBody>
+      </p:sp>
+    </p:spTree>
+    <p:extLst>
+      <p:ext uri="{BB962C8B-B14F-4D97-AF65-F5344CB8AC3E}">
+        <p14:creationId xmlns:p14="http://schemas.microsoft.com/office/powerpoint/2010/main" val="1688894193"/>
+      </p:ext>
+    </p:extLst>
+  </p:cSld>
+  <p:clrMapOvr>
+    <a:masterClrMapping/>
+  </p:clrMapOvr>
+</p:sld>
+</file>
+
 <file path=ppt/theme/theme1.xml><?xml version="1.0" encoding="utf-8"?>
 <a:theme xmlns:a="http://schemas.openxmlformats.org/drawingml/2006/main" name="Office Theme">
   <a:themeElements>

</xml_diff>

<commit_message>
Formatting of the document
</commit_message>
<xml_diff>
--- a/student-paper-competition-2014/images/images.pptx
+++ b/student-paper-competition-2014/images/images.pptx
@@ -3118,8 +3118,8 @@
         </p:nvSpPr>
         <p:spPr>
           <a:xfrm>
-            <a:off x="152400" y="152399"/>
-            <a:ext cx="8786648" cy="6453353"/>
+            <a:off x="152400" y="152400"/>
+            <a:ext cx="8786648" cy="5295563"/>
           </a:xfrm>
           <a:prstGeom prst="rect">
             <a:avLst/>
@@ -3227,8 +3227,8 @@
         </p:nvSpPr>
         <p:spPr>
           <a:xfrm>
-            <a:off x="2254942" y="231920"/>
-            <a:ext cx="1981200" cy="2590800"/>
+            <a:off x="2288360" y="231920"/>
+            <a:ext cx="1981200" cy="2074273"/>
           </a:xfrm>
           <a:prstGeom prst="snip1Rect">
             <a:avLst/>
@@ -3273,8 +3273,8 @@
         </p:nvSpPr>
         <p:spPr>
           <a:xfrm>
-            <a:off x="4381612" y="231920"/>
-            <a:ext cx="1981200" cy="2590800"/>
+            <a:off x="4415030" y="231920"/>
+            <a:ext cx="1981200" cy="2074273"/>
           </a:xfrm>
           <a:prstGeom prst="snip1Rect">
             <a:avLst/>
@@ -3319,7 +3319,7 @@
         </p:nvSpPr>
         <p:spPr>
           <a:xfrm>
-            <a:off x="2220306" y="245775"/>
+            <a:off x="2253724" y="245775"/>
             <a:ext cx="1981200" cy="381000"/>
           </a:xfrm>
           <a:prstGeom prst="rect">
@@ -3367,7 +3367,7 @@
         </p:nvSpPr>
         <p:spPr>
           <a:xfrm>
-            <a:off x="4381612" y="252703"/>
+            <a:off x="4415030" y="252703"/>
             <a:ext cx="1981200" cy="381000"/>
           </a:xfrm>
           <a:prstGeom prst="rect">
@@ -3428,8 +3428,8 @@
         </p:nvSpPr>
         <p:spPr>
           <a:xfrm>
-            <a:off x="2254942" y="626775"/>
-            <a:ext cx="1981200" cy="2123658"/>
+            <a:off x="2288360" y="626775"/>
+            <a:ext cx="1981200" cy="1615827"/>
           </a:xfrm>
           <a:prstGeom prst="rect">
             <a:avLst/>
@@ -3485,48 +3485,30 @@
             </a:endParaRPr>
           </a:p>
           <a:p>
+            <a:endParaRPr lang="en-US" sz="1100" dirty="0">
+              <a:latin typeface="Courier New" panose="02070309020205020404" pitchFamily="49" charset="0"/>
+              <a:cs typeface="Courier New" panose="02070309020205020404" pitchFamily="49" charset="0"/>
+            </a:endParaRPr>
+          </a:p>
+          <a:p>
             <a:endParaRPr lang="en-US" sz="1100" dirty="0" smtClean="0">
               <a:latin typeface="Courier New" panose="02070309020205020404" pitchFamily="49" charset="0"/>
               <a:cs typeface="Courier New" panose="02070309020205020404" pitchFamily="49" charset="0"/>
             </a:endParaRPr>
           </a:p>
           <a:p>
+            <a:r>
+              <a:rPr lang="en-US" sz="1100" dirty="0" smtClean="0">
+                <a:latin typeface="Courier New" panose="02070309020205020404" pitchFamily="49" charset="0"/>
+                <a:cs typeface="Courier New" panose="02070309020205020404" pitchFamily="49" charset="0"/>
+              </a:rPr>
+              <a:t>})</a:t>
+            </a:r>
             <a:endParaRPr lang="en-US" sz="1100" dirty="0">
               <a:latin typeface="Courier New" panose="02070309020205020404" pitchFamily="49" charset="0"/>
               <a:cs typeface="Courier New" panose="02070309020205020404" pitchFamily="49" charset="0"/>
             </a:endParaRPr>
           </a:p>
-          <a:p>
-            <a:endParaRPr lang="en-US" sz="1100" dirty="0" smtClean="0">
-              <a:latin typeface="Courier New" panose="02070309020205020404" pitchFamily="49" charset="0"/>
-              <a:cs typeface="Courier New" panose="02070309020205020404" pitchFamily="49" charset="0"/>
-            </a:endParaRPr>
-          </a:p>
-          <a:p>
-            <a:endParaRPr lang="en-US" sz="1100" dirty="0">
-              <a:latin typeface="Courier New" panose="02070309020205020404" pitchFamily="49" charset="0"/>
-              <a:cs typeface="Courier New" panose="02070309020205020404" pitchFamily="49" charset="0"/>
-            </a:endParaRPr>
-          </a:p>
-          <a:p>
-            <a:endParaRPr lang="en-US" sz="1100" dirty="0" smtClean="0">
-              <a:latin typeface="Courier New" panose="02070309020205020404" pitchFamily="49" charset="0"/>
-              <a:cs typeface="Courier New" panose="02070309020205020404" pitchFamily="49" charset="0"/>
-            </a:endParaRPr>
-          </a:p>
-          <a:p>
-            <a:r>
-              <a:rPr lang="en-US" sz="1100" dirty="0" smtClean="0">
-                <a:latin typeface="Courier New" panose="02070309020205020404" pitchFamily="49" charset="0"/>
-                <a:cs typeface="Courier New" panose="02070309020205020404" pitchFamily="49" charset="0"/>
-              </a:rPr>
-              <a:t>})</a:t>
-            </a:r>
-            <a:endParaRPr lang="en-US" sz="1100" dirty="0">
-              <a:latin typeface="Courier New" panose="02070309020205020404" pitchFamily="49" charset="0"/>
-              <a:cs typeface="Courier New" panose="02070309020205020404" pitchFamily="49" charset="0"/>
-            </a:endParaRPr>
-          </a:p>
         </p:txBody>
       </p:sp>
       <p:sp>
@@ -3537,8 +3519,8 @@
         </p:nvSpPr>
         <p:spPr>
           <a:xfrm>
-            <a:off x="4381612" y="626775"/>
-            <a:ext cx="1981200" cy="2123658"/>
+            <a:off x="4415030" y="626775"/>
+            <a:ext cx="1981200" cy="1615827"/>
           </a:xfrm>
           <a:prstGeom prst="rect">
             <a:avLst/>
@@ -3597,48 +3579,30 @@
             </a:endParaRPr>
           </a:p>
           <a:p>
+            <a:endParaRPr lang="en-US" sz="1100" dirty="0">
+              <a:latin typeface="Courier New" panose="02070309020205020404" pitchFamily="49" charset="0"/>
+              <a:cs typeface="Courier New" panose="02070309020205020404" pitchFamily="49" charset="0"/>
+            </a:endParaRPr>
+          </a:p>
+          <a:p>
             <a:endParaRPr lang="en-US" sz="1100" dirty="0" smtClean="0">
               <a:latin typeface="Courier New" panose="02070309020205020404" pitchFamily="49" charset="0"/>
               <a:cs typeface="Courier New" panose="02070309020205020404" pitchFamily="49" charset="0"/>
             </a:endParaRPr>
           </a:p>
           <a:p>
+            <a:r>
+              <a:rPr lang="en-US" sz="1100" dirty="0" smtClean="0">
+                <a:latin typeface="Courier New" panose="02070309020205020404" pitchFamily="49" charset="0"/>
+                <a:cs typeface="Courier New" panose="02070309020205020404" pitchFamily="49" charset="0"/>
+              </a:rPr>
+              <a:t>})</a:t>
+            </a:r>
             <a:endParaRPr lang="en-US" sz="1100" dirty="0">
               <a:latin typeface="Courier New" panose="02070309020205020404" pitchFamily="49" charset="0"/>
               <a:cs typeface="Courier New" panose="02070309020205020404" pitchFamily="49" charset="0"/>
             </a:endParaRPr>
           </a:p>
-          <a:p>
-            <a:endParaRPr lang="en-US" sz="1100" dirty="0" smtClean="0">
-              <a:latin typeface="Courier New" panose="02070309020205020404" pitchFamily="49" charset="0"/>
-              <a:cs typeface="Courier New" panose="02070309020205020404" pitchFamily="49" charset="0"/>
-            </a:endParaRPr>
-          </a:p>
-          <a:p>
-            <a:endParaRPr lang="en-US" sz="1100" dirty="0">
-              <a:latin typeface="Courier New" panose="02070309020205020404" pitchFamily="49" charset="0"/>
-              <a:cs typeface="Courier New" panose="02070309020205020404" pitchFamily="49" charset="0"/>
-            </a:endParaRPr>
-          </a:p>
-          <a:p>
-            <a:endParaRPr lang="en-US" sz="1100" dirty="0" smtClean="0">
-              <a:latin typeface="Courier New" panose="02070309020205020404" pitchFamily="49" charset="0"/>
-              <a:cs typeface="Courier New" panose="02070309020205020404" pitchFamily="49" charset="0"/>
-            </a:endParaRPr>
-          </a:p>
-          <a:p>
-            <a:r>
-              <a:rPr lang="en-US" sz="1100" dirty="0" smtClean="0">
-                <a:latin typeface="Courier New" panose="02070309020205020404" pitchFamily="49" charset="0"/>
-                <a:cs typeface="Courier New" panose="02070309020205020404" pitchFamily="49" charset="0"/>
-              </a:rPr>
-              <a:t>})</a:t>
-            </a:r>
-            <a:endParaRPr lang="en-US" sz="1100" dirty="0">
-              <a:latin typeface="Courier New" panose="02070309020205020404" pitchFamily="49" charset="0"/>
-              <a:cs typeface="Courier New" panose="02070309020205020404" pitchFamily="49" charset="0"/>
-            </a:endParaRPr>
-          </a:p>
         </p:txBody>
       </p:sp>
       <p:sp>
@@ -3649,8 +3613,8 @@
         </p:nvSpPr>
         <p:spPr>
           <a:xfrm>
-            <a:off x="2310360" y="1194810"/>
-            <a:ext cx="1870364" cy="1295400"/>
+            <a:off x="2343778" y="1244946"/>
+            <a:ext cx="1870364" cy="727018"/>
           </a:xfrm>
           <a:prstGeom prst="rect">
             <a:avLst/>
@@ -3698,8 +3662,8 @@
         </p:nvSpPr>
         <p:spPr>
           <a:xfrm>
-            <a:off x="4437030" y="1194810"/>
-            <a:ext cx="1870364" cy="1295400"/>
+            <a:off x="4470448" y="1244946"/>
+            <a:ext cx="1870364" cy="743729"/>
           </a:xfrm>
           <a:prstGeom prst="rect">
             <a:avLst/>
@@ -3747,8 +3711,8 @@
         </p:nvSpPr>
         <p:spPr>
           <a:xfrm>
-            <a:off x="3307886" y="3006294"/>
-            <a:ext cx="2189019" cy="2590800"/>
+            <a:off x="3458267" y="2755614"/>
+            <a:ext cx="2189019" cy="2224419"/>
           </a:xfrm>
           <a:prstGeom prst="snip1Rect">
             <a:avLst/>
@@ -3795,7 +3759,7 @@
         </p:nvSpPr>
         <p:spPr>
           <a:xfrm>
-            <a:off x="3273251" y="3020149"/>
+            <a:off x="3423632" y="2769469"/>
             <a:ext cx="1981200" cy="381000"/>
           </a:xfrm>
           <a:prstGeom prst="rect">
@@ -3843,7 +3807,7 @@
         </p:nvSpPr>
         <p:spPr>
           <a:xfrm>
-            <a:off x="3307884" y="3536850"/>
+            <a:off x="3458265" y="3286170"/>
             <a:ext cx="2294805" cy="1615827"/>
           </a:xfrm>
           <a:prstGeom prst="rect">
@@ -4002,12 +3966,12 @@
         </p:nvCxnSpPr>
         <p:spPr>
           <a:xfrm rot="10800000" flipH="1" flipV="1">
-            <a:off x="2310360" y="1842510"/>
-            <a:ext cx="997526" cy="2459184"/>
+            <a:off x="2343777" y="1608454"/>
+            <a:ext cx="1114489" cy="2259369"/>
           </a:xfrm>
           <a:prstGeom prst="curvedConnector3">
             <a:avLst>
-              <a:gd name="adj1" fmla="val -111348"/>
+              <a:gd name="adj1" fmla="val -95475"/>
             </a:avLst>
           </a:prstGeom>
           <a:ln w="12700">
@@ -4048,12 +4012,12 @@
         </p:nvCxnSpPr>
         <p:spPr>
           <a:xfrm flipH="1">
-            <a:off x="5496905" y="1842510"/>
-            <a:ext cx="810489" cy="2459184"/>
+            <a:off x="5647286" y="1616811"/>
+            <a:ext cx="693526" cy="2251013"/>
           </a:xfrm>
           <a:prstGeom prst="curvedConnector3">
             <a:avLst>
-              <a:gd name="adj1" fmla="val -135717"/>
+              <a:gd name="adj1" fmla="val -182338"/>
             </a:avLst>
           </a:prstGeom>
           <a:ln w="12700">
@@ -4091,7 +4055,7 @@
         </p:nvSpPr>
         <p:spPr>
           <a:xfrm>
-            <a:off x="315306" y="4118120"/>
+            <a:off x="415560" y="3015123"/>
             <a:ext cx="2396829" cy="2324464"/>
           </a:xfrm>
           <a:prstGeom prst="snip1Rect">
@@ -4139,7 +4103,7 @@
         </p:nvSpPr>
         <p:spPr>
           <a:xfrm>
-            <a:off x="316355" y="2912313"/>
+            <a:off x="416609" y="1809316"/>
             <a:ext cx="2011428" cy="1195063"/>
           </a:xfrm>
           <a:custGeom>
@@ -4270,7 +4234,7 @@
         </p:nvCxnSpPr>
         <p:spPr>
           <a:xfrm flipH="1">
-            <a:off x="315307" y="2912313"/>
+            <a:off x="415561" y="1809316"/>
             <a:ext cx="339436" cy="1189138"/>
           </a:xfrm>
           <a:prstGeom prst="line">
@@ -4309,7 +4273,7 @@
         </p:nvCxnSpPr>
         <p:spPr>
           <a:xfrm>
-            <a:off x="1915507" y="2912313"/>
+            <a:off x="2015761" y="1809316"/>
             <a:ext cx="411206" cy="1193134"/>
           </a:xfrm>
           <a:prstGeom prst="line">
@@ -4348,7 +4312,7 @@
         </p:nvSpPr>
         <p:spPr>
           <a:xfrm>
-            <a:off x="654743" y="2570741"/>
+            <a:off x="754997" y="1467744"/>
             <a:ext cx="1336963" cy="1279815"/>
           </a:xfrm>
           <a:prstGeom prst="flowChartConnector">
@@ -4399,7 +4363,7 @@
         </p:nvSpPr>
         <p:spPr>
           <a:xfrm>
-            <a:off x="848704" y="2628184"/>
+            <a:off x="948958" y="1525187"/>
             <a:ext cx="1461654" cy="1169551"/>
           </a:xfrm>
           <a:prstGeom prst="rect">
@@ -4547,7 +4511,7 @@
         </p:nvSpPr>
         <p:spPr>
           <a:xfrm>
-            <a:off x="654743" y="2637993"/>
+            <a:off x="754997" y="1534996"/>
             <a:ext cx="1260763" cy="274320"/>
           </a:xfrm>
           <a:prstGeom prst="rect">
@@ -4594,7 +4558,7 @@
         </p:nvSpPr>
         <p:spPr>
           <a:xfrm>
-            <a:off x="6365542" y="2939437"/>
+            <a:off x="6365542" y="1836445"/>
             <a:ext cx="2008292" cy="1168643"/>
           </a:xfrm>
           <a:custGeom>
@@ -4745,7 +4709,7 @@
         </p:nvCxnSpPr>
         <p:spPr>
           <a:xfrm flipH="1">
-            <a:off x="6361184" y="2939438"/>
+            <a:off x="6361184" y="1836446"/>
             <a:ext cx="339436" cy="1189138"/>
           </a:xfrm>
           <a:prstGeom prst="line">
@@ -4784,7 +4748,7 @@
         </p:nvCxnSpPr>
         <p:spPr>
           <a:xfrm>
-            <a:off x="7961384" y="2939438"/>
+            <a:off x="7961384" y="1836446"/>
             <a:ext cx="413378" cy="1166552"/>
           </a:xfrm>
           <a:prstGeom prst="line">
@@ -4823,7 +4787,7 @@
         </p:nvSpPr>
         <p:spPr>
           <a:xfrm>
-            <a:off x="6700620" y="2597866"/>
+            <a:off x="6700620" y="1494874"/>
             <a:ext cx="1336963" cy="1279815"/>
           </a:xfrm>
           <a:prstGeom prst="flowChartConnector">
@@ -4874,7 +4838,7 @@
         </p:nvSpPr>
         <p:spPr>
           <a:xfrm>
-            <a:off x="6894581" y="2655309"/>
+            <a:off x="6894581" y="1552317"/>
             <a:ext cx="1461654" cy="307777"/>
           </a:xfrm>
           <a:prstGeom prst="rect">
@@ -4935,7 +4899,7 @@
         </p:nvSpPr>
         <p:spPr>
           <a:xfrm>
-            <a:off x="6700620" y="2665118"/>
+            <a:off x="6700620" y="1562126"/>
             <a:ext cx="1260763" cy="274320"/>
           </a:xfrm>
           <a:prstGeom prst="rect">
@@ -4982,7 +4946,7 @@
         </p:nvSpPr>
         <p:spPr>
           <a:xfrm>
-            <a:off x="315306" y="4118120"/>
+            <a:off x="415560" y="3015123"/>
             <a:ext cx="2396828" cy="2308324"/>
           </a:xfrm>
           <a:prstGeom prst="rect">
@@ -5371,7 +5335,7 @@
         </p:nvSpPr>
         <p:spPr>
           <a:xfrm>
-            <a:off x="121337" y="2303187"/>
+            <a:off x="221591" y="1200190"/>
             <a:ext cx="2590799" cy="307777"/>
           </a:xfrm>
           <a:prstGeom prst="rect">
@@ -5419,7 +5383,7 @@
         </p:nvSpPr>
         <p:spPr>
           <a:xfrm>
-            <a:off x="6435558" y="2303187"/>
+            <a:off x="6435558" y="1200195"/>
             <a:ext cx="2590799" cy="307777"/>
           </a:xfrm>
           <a:prstGeom prst="rect">
@@ -5467,7 +5431,7 @@
         </p:nvSpPr>
         <p:spPr>
           <a:xfrm>
-            <a:off x="6362812" y="4118120"/>
+            <a:off x="6362812" y="3015128"/>
             <a:ext cx="2396829" cy="2324464"/>
           </a:xfrm>
           <a:prstGeom prst="snip1Rect">
@@ -5515,7 +5479,7 @@
         </p:nvSpPr>
         <p:spPr>
           <a:xfrm>
-            <a:off x="6362812" y="4118120"/>
+            <a:off x="6362812" y="3015128"/>
             <a:ext cx="2396828" cy="2308324"/>
           </a:xfrm>
           <a:prstGeom prst="rect">
@@ -6821,6 +6785,56 @@
       </p:grpSpPr>
       <p:sp>
         <p:nvSpPr>
+          <p:cNvPr id="27" name="Rectangle 26"/>
+          <p:cNvSpPr/>
+          <p:nvPr/>
+        </p:nvSpPr>
+        <p:spPr>
+          <a:xfrm>
+            <a:off x="267344" y="3058213"/>
+            <a:ext cx="1320011" cy="534769"/>
+          </a:xfrm>
+          <a:prstGeom prst="rect">
+            <a:avLst/>
+          </a:prstGeom>
+          <a:solidFill>
+            <a:srgbClr val="4DAA88"/>
+          </a:solidFill>
+          <a:ln>
+            <a:solidFill>
+              <a:srgbClr val="FFFFFF"/>
+            </a:solidFill>
+          </a:ln>
+        </p:spPr>
+        <p:style>
+          <a:lnRef idx="1">
+            <a:schemeClr val="accent1"/>
+          </a:lnRef>
+          <a:fillRef idx="3">
+            <a:schemeClr val="accent1"/>
+          </a:fillRef>
+          <a:effectRef idx="2">
+            <a:schemeClr val="accent1"/>
+          </a:effectRef>
+          <a:fontRef idx="minor">
+            <a:schemeClr val="lt1"/>
+          </a:fontRef>
+        </p:style>
+        <p:txBody>
+          <a:bodyPr rtlCol="0" anchor="ctr"/>
+          <a:lstStyle/>
+          <a:p>
+            <a:pPr algn="ctr"/>
+            <a:r>
+              <a:rPr lang="en-US" dirty="0" smtClean="0"/>
+              <a:t>Graphical</a:t>
+            </a:r>
+            <a:endParaRPr lang="en-US" dirty="0"/>
+          </a:p>
+        </p:txBody>
+      </p:sp>
+      <p:sp>
+        <p:nvSpPr>
           <p:cNvPr id="21" name="Rectangle 20"/>
           <p:cNvSpPr/>
           <p:nvPr/>
@@ -6828,7 +6842,7 @@
         <p:spPr>
           <a:xfrm>
             <a:off x="0" y="2774121"/>
-            <a:ext cx="2640022" cy="2122366"/>
+            <a:ext cx="1971662" cy="2122366"/>
           </a:xfrm>
           <a:prstGeom prst="rect">
             <a:avLst/>
@@ -6865,36 +6879,6 @@
           </a:p>
         </p:txBody>
       </p:sp>
-      <p:pic>
-        <p:nvPicPr>
-          <p:cNvPr id="4" name="Picture 3" descr="Screen Shot 2014-12-11 at 5.18.33 PM.png"/>
-          <p:cNvPicPr>
-            <a:picLocks noChangeAspect="1"/>
-          </p:cNvPicPr>
-          <p:nvPr/>
-        </p:nvPicPr>
-        <p:blipFill>
-          <a:blip r:embed="rId2">
-            <a:extLst>
-              <a:ext uri="{28A0092B-C50C-407E-A947-70E740481C1C}">
-                <a14:useLocalDpi xmlns:a14="http://schemas.microsoft.com/office/drawing/2010/main" val="0"/>
-              </a:ext>
-            </a:extLst>
-          </a:blip>
-          <a:stretch>
-            <a:fillRect/>
-          </a:stretch>
-        </p:blipFill>
-        <p:spPr>
-          <a:xfrm>
-            <a:off x="111927" y="3066712"/>
-            <a:ext cx="2336800" cy="444500"/>
-          </a:xfrm>
-          <a:prstGeom prst="rect">
-            <a:avLst/>
-          </a:prstGeom>
-        </p:spPr>
-      </p:pic>
       <p:sp>
         <p:nvSpPr>
           <p:cNvPr id="13" name="7-Point Star 12"/>
@@ -6903,7 +6887,7 @@
         </p:nvSpPr>
         <p:spPr>
           <a:xfrm>
-            <a:off x="1988371" y="3125063"/>
+            <a:off x="1353429" y="3392448"/>
             <a:ext cx="300762" cy="317519"/>
           </a:xfrm>
           <a:prstGeom prst="star7">
@@ -6960,7 +6944,7 @@
         </p:nvCxnSpPr>
         <p:spPr>
           <a:xfrm flipH="1" flipV="1">
-            <a:off x="2122045" y="3258758"/>
+            <a:off x="1487103" y="3526143"/>
             <a:ext cx="133670" cy="284095"/>
           </a:xfrm>
           <a:prstGeom prst="straightConnector1">
@@ -7008,8 +6992,8 @@
         </p:nvSpPr>
         <p:spPr>
           <a:xfrm>
-            <a:off x="467852" y="3877083"/>
-            <a:ext cx="1654191" cy="718597"/>
+            <a:off x="300763" y="3877083"/>
+            <a:ext cx="1236466" cy="718597"/>
           </a:xfrm>
           <a:prstGeom prst="flowChartDecision">
             <a:avLst/>
@@ -7046,13 +7030,6 @@
           <a:lstStyle/>
           <a:p>
             <a:pPr algn="ctr"/>
-            <a:r>
-              <a:rPr lang="en-US" sz="1400" dirty="0" smtClean="0">
-                <a:latin typeface="Cambria Math"/>
-                <a:cs typeface="Cambria Math"/>
-              </a:rPr>
-              <a:t>Options</a:t>
-            </a:r>
             <a:endParaRPr lang="en-US" sz="1400" dirty="0">
               <a:latin typeface="Cambria Math"/>
               <a:cs typeface="Cambria Math"/>
@@ -7069,14 +7046,14 @@
           <p:nvPr/>
         </p:nvPicPr>
         <p:blipFill rotWithShape="1">
-          <a:blip r:embed="rId3"/>
+          <a:blip r:embed="rId2"/>
           <a:srcRect l="20832" r="22339"/>
           <a:stretch/>
         </p:blipFill>
         <p:spPr>
           <a:xfrm>
-            <a:off x="3325091" y="2578862"/>
-            <a:ext cx="1492694" cy="1371600"/>
+            <a:off x="2506349" y="2578862"/>
+            <a:ext cx="1903879" cy="1749428"/>
           </a:xfrm>
           <a:prstGeom prst="rect">
             <a:avLst/>
@@ -7092,14 +7069,14 @@
           <p:nvPr/>
         </p:nvPicPr>
         <p:blipFill>
-          <a:blip r:embed="rId4"/>
+          <a:blip r:embed="rId3"/>
           <a:stretch>
             <a:fillRect/>
           </a:stretch>
         </p:blipFill>
         <p:spPr>
           <a:xfrm>
-            <a:off x="6328319" y="2946458"/>
+            <a:off x="5058435" y="3063442"/>
             <a:ext cx="914400" cy="914400"/>
           </a:xfrm>
           <a:prstGeom prst="rect">
@@ -7115,8 +7092,8 @@
         </p:nvSpPr>
         <p:spPr>
           <a:xfrm>
-            <a:off x="8187410" y="2874385"/>
-            <a:ext cx="2640022" cy="2373039"/>
+            <a:off x="6583346" y="2874385"/>
+            <a:ext cx="2974202" cy="1069539"/>
           </a:xfrm>
           <a:prstGeom prst="snip1Rect">
             <a:avLst/>
@@ -7169,8 +7146,8 @@
         </p:nvSpPr>
         <p:spPr>
           <a:xfrm>
-            <a:off x="8137283" y="2824251"/>
-            <a:ext cx="2773694" cy="2631489"/>
+            <a:off x="6533218" y="2824251"/>
+            <a:ext cx="3024329" cy="1015663"/>
           </a:xfrm>
           <a:prstGeom prst="rect">
             <a:avLst/>
@@ -7184,315 +7161,83 @@
           <a:lstStyle/>
           <a:p>
             <a:r>
-              <a:rPr lang="en-US" sz="1100" dirty="0" err="1">
+              <a:rPr lang="en-US" sz="2000" dirty="0" err="1">
                 <a:latin typeface="Courier New"/>
                 <a:cs typeface="Courier New"/>
               </a:rPr>
               <a:t>ggplot</a:t>
             </a:r>
             <a:r>
-              <a:rPr lang="en-US" sz="1100" dirty="0">
+              <a:rPr lang="en-US" sz="2000" dirty="0">
                 <a:latin typeface="Courier New"/>
                 <a:cs typeface="Courier New"/>
               </a:rPr>
               <a:t>(</a:t>
             </a:r>
             <a:r>
-              <a:rPr lang="en-US" sz="1100" dirty="0" err="1">
+              <a:rPr lang="en-US" sz="2000" dirty="0" err="1">
                 <a:latin typeface="Courier New"/>
                 <a:cs typeface="Courier New"/>
               </a:rPr>
               <a:t>plot_data</a:t>
             </a:r>
             <a:r>
-              <a:rPr lang="en-US" sz="1100" dirty="0">
+              <a:rPr lang="en-US" sz="2000" dirty="0">
                 <a:latin typeface="Courier New"/>
                 <a:cs typeface="Courier New"/>
               </a:rPr>
               <a:t>, </a:t>
             </a:r>
             <a:r>
-              <a:rPr lang="en-US" sz="1100" dirty="0" err="1">
+              <a:rPr lang="en-US" sz="2000" dirty="0" err="1">
                 <a:latin typeface="Courier New"/>
                 <a:cs typeface="Courier New"/>
               </a:rPr>
               <a:t>aes</a:t>
             </a:r>
             <a:r>
-              <a:rPr lang="en-US" sz="1100" dirty="0">
+              <a:rPr lang="en-US" sz="2000" dirty="0">
                 <a:latin typeface="Courier New"/>
                 <a:cs typeface="Courier New"/>
               </a:rPr>
               <a:t>(</a:t>
             </a:r>
             <a:r>
-              <a:rPr lang="en-US" sz="1100" dirty="0" err="1">
+              <a:rPr lang="en-US" sz="2000" dirty="0" err="1">
                 <a:latin typeface="Courier New"/>
                 <a:cs typeface="Courier New"/>
               </a:rPr>
               <a:t>x_center</a:t>
             </a:r>
             <a:r>
-              <a:rPr lang="en-US" sz="1100" dirty="0">
+              <a:rPr lang="en-US" sz="2000" dirty="0">
                 <a:latin typeface="Courier New"/>
                 <a:cs typeface="Courier New"/>
               </a:rPr>
               <a:t>, </a:t>
             </a:r>
             <a:r>
-              <a:rPr lang="en-US" sz="1100" dirty="0" err="1">
+              <a:rPr lang="en-US" sz="2000" dirty="0" err="1">
                 <a:latin typeface="Courier New"/>
                 <a:cs typeface="Courier New"/>
               </a:rPr>
               <a:t>y_height</a:t>
             </a:r>
             <a:r>
-              <a:rPr lang="en-US" sz="1100" dirty="0">
+              <a:rPr lang="en-US" sz="2000" dirty="0">
                 <a:latin typeface="Courier New"/>
                 <a:cs typeface="Courier New"/>
               </a:rPr>
-              <a:t>)) + </a:t>
-            </a:r>
-            <a:r>
-              <a:rPr lang="en-US" sz="1100" dirty="0" err="1">
+              <a:t>)) </a:t>
+            </a:r>
+            <a:r>
+              <a:rPr lang="en-US" sz="2000" dirty="0" smtClean="0">
                 <a:latin typeface="Courier New"/>
                 <a:cs typeface="Courier New"/>
               </a:rPr>
-              <a:t>geom_bar</a:t>
-            </a:r>
-            <a:r>
-              <a:rPr lang="en-US" sz="1100" dirty="0">
-                <a:latin typeface="Courier New"/>
-                <a:cs typeface="Courier New"/>
-              </a:rPr>
-              <a:t>(stat = "identity", </a:t>
-            </a:r>
-            <a:r>
-              <a:rPr lang="en-US" sz="1100" dirty="0" err="1">
-                <a:latin typeface="Courier New"/>
-                <a:cs typeface="Courier New"/>
-              </a:rPr>
-              <a:t>aes_string</a:t>
-            </a:r>
-            <a:r>
-              <a:rPr lang="en-US" sz="1100" dirty="0">
-                <a:latin typeface="Courier New"/>
-                <a:cs typeface="Courier New"/>
-              </a:rPr>
-              <a:t>(width = "</a:t>
-            </a:r>
-            <a:r>
-              <a:rPr lang="en-US" sz="1100" dirty="0" err="1">
-                <a:latin typeface="Courier New"/>
-                <a:cs typeface="Courier New"/>
-              </a:rPr>
-              <a:t>margin_x</a:t>
-            </a:r>
-            <a:r>
-              <a:rPr lang="en-US" sz="1100" dirty="0">
-                <a:latin typeface="Courier New"/>
-                <a:cs typeface="Courier New"/>
-              </a:rPr>
-              <a:t>", </a:t>
-            </a:r>
-          </a:p>
-          <a:p>
-            <a:r>
-              <a:rPr lang="en-US" sz="1100" dirty="0">
-                <a:latin typeface="Courier New"/>
-                <a:cs typeface="Courier New"/>
-              </a:rPr>
-              <a:t>    fill = "</a:t>
-            </a:r>
-            <a:r>
-              <a:rPr lang="en-US" sz="1100" dirty="0" err="1">
-                <a:latin typeface="Courier New"/>
-                <a:cs typeface="Courier New"/>
-              </a:rPr>
-              <a:t>drv</a:t>
-            </a:r>
-            <a:r>
-              <a:rPr lang="en-US" sz="1100" dirty="0">
-                <a:latin typeface="Courier New"/>
-                <a:cs typeface="Courier New"/>
-              </a:rPr>
-              <a:t>"), col = "Black") + </a:t>
-            </a:r>
-            <a:r>
-              <a:rPr lang="en-US" sz="1100" dirty="0" err="1">
-                <a:latin typeface="Courier New"/>
-                <a:cs typeface="Courier New"/>
-              </a:rPr>
-              <a:t>geom_text</a:t>
-            </a:r>
-            <a:r>
-              <a:rPr lang="en-US" sz="1100" dirty="0">
-                <a:latin typeface="Courier New"/>
-                <a:cs typeface="Courier New"/>
-              </a:rPr>
-              <a:t>(</a:t>
-            </a:r>
-            <a:r>
-              <a:rPr lang="en-US" sz="1100" dirty="0" err="1">
-                <a:latin typeface="Courier New"/>
-                <a:cs typeface="Courier New"/>
-              </a:rPr>
-              <a:t>aes_string</a:t>
-            </a:r>
-            <a:r>
-              <a:rPr lang="en-US" sz="1100" dirty="0">
-                <a:latin typeface="Courier New"/>
-                <a:cs typeface="Courier New"/>
-              </a:rPr>
-              <a:t>(label = "class", x = "</a:t>
-            </a:r>
-            <a:r>
-              <a:rPr lang="en-US" sz="1100" dirty="0" err="1">
-                <a:latin typeface="Courier New"/>
-                <a:cs typeface="Courier New"/>
-              </a:rPr>
-              <a:t>x_center</a:t>
-            </a:r>
-            <a:r>
-              <a:rPr lang="en-US" sz="1100" dirty="0">
-                <a:latin typeface="Courier New"/>
-                <a:cs typeface="Courier New"/>
-              </a:rPr>
-              <a:t>", </a:t>
-            </a:r>
-          </a:p>
-          <a:p>
-            <a:r>
-              <a:rPr lang="en-US" sz="1100" dirty="0">
-                <a:latin typeface="Courier New"/>
-                <a:cs typeface="Courier New"/>
-              </a:rPr>
-              <a:t>    y = "1.05"), angle = 45, </a:t>
-            </a:r>
-            <a:r>
-              <a:rPr lang="en-US" sz="1100" dirty="0" err="1">
-                <a:latin typeface="Courier New"/>
-                <a:cs typeface="Courier New"/>
-              </a:rPr>
-              <a:t>hjust</a:t>
-            </a:r>
-            <a:r>
-              <a:rPr lang="en-US" sz="1100" dirty="0">
-                <a:latin typeface="Courier New"/>
-                <a:cs typeface="Courier New"/>
-              </a:rPr>
-              <a:t> = 0) + </a:t>
-            </a:r>
-            <a:r>
-              <a:rPr lang="en-US" sz="1100" dirty="0" err="1">
-                <a:latin typeface="Courier New"/>
-                <a:cs typeface="Courier New"/>
-              </a:rPr>
-              <a:t>xlim</a:t>
-            </a:r>
-            <a:r>
-              <a:rPr lang="en-US" sz="1100" dirty="0">
-                <a:latin typeface="Courier New"/>
-                <a:cs typeface="Courier New"/>
-              </a:rPr>
-              <a:t>(c(0, 1.2)) + </a:t>
-            </a:r>
-            <a:r>
-              <a:rPr lang="en-US" sz="1100" dirty="0" err="1">
-                <a:latin typeface="Courier New"/>
-                <a:cs typeface="Courier New"/>
-              </a:rPr>
-              <a:t>ylim</a:t>
-            </a:r>
-            <a:r>
-              <a:rPr lang="en-US" sz="1100" dirty="0">
-                <a:latin typeface="Courier New"/>
-                <a:cs typeface="Courier New"/>
-              </a:rPr>
-              <a:t>(c(0, 1.2)) + </a:t>
-            </a:r>
-            <a:r>
-              <a:rPr lang="en-US" sz="1100" dirty="0" err="1">
-                <a:latin typeface="Courier New"/>
-                <a:cs typeface="Courier New"/>
-              </a:rPr>
-              <a:t>xlab</a:t>
-            </a:r>
-            <a:r>
-              <a:rPr lang="en-US" sz="1100" dirty="0">
-                <a:latin typeface="Courier New"/>
-                <a:cs typeface="Courier New"/>
-              </a:rPr>
-              <a:t>("class") + </a:t>
-            </a:r>
-          </a:p>
-          <a:p>
-            <a:r>
-              <a:rPr lang="en-US" sz="1100" dirty="0">
-                <a:latin typeface="Courier New"/>
-                <a:cs typeface="Courier New"/>
-              </a:rPr>
-              <a:t>    </a:t>
-            </a:r>
-            <a:r>
-              <a:rPr lang="en-US" sz="1100" dirty="0" err="1">
-                <a:latin typeface="Courier New"/>
-                <a:cs typeface="Courier New"/>
-              </a:rPr>
-              <a:t>ylab</a:t>
-            </a:r>
-            <a:r>
-              <a:rPr lang="en-US" sz="1100" dirty="0">
-                <a:latin typeface="Courier New"/>
-                <a:cs typeface="Courier New"/>
-              </a:rPr>
-              <a:t>("</a:t>
-            </a:r>
-            <a:r>
-              <a:rPr lang="en-US" sz="1100" dirty="0" err="1">
-                <a:latin typeface="Courier New"/>
-                <a:cs typeface="Courier New"/>
-              </a:rPr>
-              <a:t>drv</a:t>
-            </a:r>
-            <a:r>
-              <a:rPr lang="en-US" sz="1100" dirty="0">
-                <a:latin typeface="Courier New"/>
-                <a:cs typeface="Courier New"/>
-              </a:rPr>
-              <a:t>") + </a:t>
-            </a:r>
-            <a:r>
-              <a:rPr lang="en-US" sz="1100" dirty="0" err="1">
-                <a:latin typeface="Courier New"/>
-                <a:cs typeface="Courier New"/>
-              </a:rPr>
-              <a:t>theme_bw</a:t>
-            </a:r>
-            <a:r>
-              <a:rPr lang="en-US" sz="1100" dirty="0">
-                <a:latin typeface="Courier New"/>
-                <a:cs typeface="Courier New"/>
-              </a:rPr>
-              <a:t>() + </a:t>
-            </a:r>
-            <a:r>
-              <a:rPr lang="en-US" sz="1100" dirty="0" err="1">
-                <a:latin typeface="Courier New"/>
-                <a:cs typeface="Courier New"/>
-              </a:rPr>
-              <a:t>coord_fixed</a:t>
-            </a:r>
-            <a:r>
-              <a:rPr lang="en-US" sz="1100" dirty="0">
-                <a:latin typeface="Courier New"/>
-                <a:cs typeface="Courier New"/>
-              </a:rPr>
-              <a:t>()</a:t>
-            </a:r>
-          </a:p>
-          <a:p>
-            <a:endParaRPr lang="en-US" sz="1100" dirty="0"/>
+              <a:t>+ …</a:t>
+            </a:r>
+            <a:endParaRPr lang="en-US" sz="2000" dirty="0"/>
           </a:p>
         </p:txBody>
       </p:sp>
@@ -7504,8 +7249,8 @@
         </p:nvSpPr>
         <p:spPr>
           <a:xfrm>
-            <a:off x="1219757" y="1286789"/>
-            <a:ext cx="3191419" cy="1286789"/>
+            <a:off x="768615" y="1286789"/>
+            <a:ext cx="2756984" cy="1286789"/>
           </a:xfrm>
           <a:prstGeom prst="curvedDownArrow">
             <a:avLst/>
@@ -7553,14 +7298,60 @@
       </p:sp>
       <p:sp>
         <p:nvSpPr>
-          <p:cNvPr id="24" name="Curved Down Arrow 23"/>
+          <p:cNvPr id="26" name="TextBox 25"/>
+          <p:cNvSpPr txBox="1"/>
+          <p:nvPr/>
+        </p:nvSpPr>
+        <p:spPr>
+          <a:xfrm>
+            <a:off x="451143" y="4010770"/>
+            <a:ext cx="1052667" cy="369332"/>
+          </a:xfrm>
+          <a:prstGeom prst="rect">
+            <a:avLst/>
+          </a:prstGeom>
+          <a:noFill/>
+        </p:spPr>
+        <p:txBody>
+          <a:bodyPr wrap="square" rtlCol="0">
+            <a:spAutoFit/>
+          </a:bodyPr>
+          <a:lstStyle/>
+          <a:p>
+            <a:r>
+              <a:rPr lang="en-US" dirty="0" smtClean="0">
+                <a:solidFill>
+                  <a:schemeClr val="bg1">
+                    <a:lumMod val="95000"/>
+                  </a:schemeClr>
+                </a:solidFill>
+                <a:latin typeface="Cambria Math"/>
+                <a:cs typeface="Cambria Math"/>
+              </a:rPr>
+              <a:t>Options</a:t>
+            </a:r>
+            <a:endParaRPr lang="en-US" dirty="0">
+              <a:solidFill>
+                <a:schemeClr val="bg1">
+                  <a:lumMod val="95000"/>
+                </a:schemeClr>
+              </a:solidFill>
+              <a:latin typeface="Cambria Math"/>
+              <a:cs typeface="Cambria Math"/>
+            </a:endParaRPr>
+          </a:p>
+        </p:txBody>
+      </p:sp>
+      <p:sp>
+        <p:nvSpPr>
+          <p:cNvPr id="28" name="Curved Down Arrow 27"/>
           <p:cNvSpPr/>
           <p:nvPr/>
         </p:nvSpPr>
         <p:spPr>
           <a:xfrm rot="10800000">
-            <a:off x="3895216" y="4046192"/>
-            <a:ext cx="3191419" cy="1286789"/>
+            <a:off x="3043058" y="4397136"/>
+            <a:ext cx="2756984" cy="1286789"/>
           </a:xfrm>
           <a:prstGeom prst="curvedDownArrow">
             <a:avLst/>
@@ -7614,14 +7405,14 @@
       </p:sp>
       <p:sp>
         <p:nvSpPr>
-          <p:cNvPr id="25" name="Curved Down Arrow 24"/>
+          <p:cNvPr id="29" name="Curved Down Arrow 28"/>
           <p:cNvSpPr/>
           <p:nvPr/>
         </p:nvSpPr>
         <p:spPr>
           <a:xfrm>
-            <a:off x="6568656" y="1439189"/>
-            <a:ext cx="3191419" cy="1286789"/>
+            <a:off x="5267374" y="1407762"/>
+            <a:ext cx="2756984" cy="1286789"/>
           </a:xfrm>
           <a:prstGeom prst="curvedDownArrow">
             <a:avLst/>

</xml_diff>